<commit_message>
[UPDATE]: Numerado os tópicos de acordo com o conteúdo montado na apresentação.
</commit_message>
<xml_diff>
--- a/Presentation/AspNetMvc.pptx
+++ b/Presentation/AspNetMvc.pptx
@@ -7,18 +7,21 @@
   <p:sldIdLst>
     <p:sldId id="256" r:id="rId2"/>
     <p:sldId id="257" r:id="rId3"/>
-    <p:sldId id="258" r:id="rId4"/>
-    <p:sldId id="259" r:id="rId5"/>
-    <p:sldId id="260" r:id="rId6"/>
-    <p:sldId id="261" r:id="rId7"/>
-    <p:sldId id="262" r:id="rId8"/>
-    <p:sldId id="263" r:id="rId9"/>
-    <p:sldId id="264" r:id="rId10"/>
-    <p:sldId id="265" r:id="rId11"/>
-    <p:sldId id="266" r:id="rId12"/>
-    <p:sldId id="267" r:id="rId13"/>
-    <p:sldId id="268" r:id="rId14"/>
-    <p:sldId id="269" r:id="rId15"/>
+    <p:sldId id="270" r:id="rId4"/>
+    <p:sldId id="258" r:id="rId5"/>
+    <p:sldId id="259" r:id="rId6"/>
+    <p:sldId id="271" r:id="rId7"/>
+    <p:sldId id="261" r:id="rId8"/>
+    <p:sldId id="260" r:id="rId9"/>
+    <p:sldId id="262" r:id="rId10"/>
+    <p:sldId id="272" r:id="rId11"/>
+    <p:sldId id="263" r:id="rId12"/>
+    <p:sldId id="264" r:id="rId13"/>
+    <p:sldId id="265" r:id="rId14"/>
+    <p:sldId id="266" r:id="rId15"/>
+    <p:sldId id="269" r:id="rId16"/>
+    <p:sldId id="267" r:id="rId17"/>
+    <p:sldId id="273" r:id="rId18"/>
   </p:sldIdLst>
   <p:sldSz cx="12192000" cy="6858000"/>
   <p:notesSz cx="6858000" cy="9144000"/>
@@ -117,6 +120,11 @@
       </a:defRPr>
     </a:lvl9pPr>
   </p:defaultTextStyle>
+  <p:extLst>
+    <p:ext uri="{EFAFB233-063F-42B5-8137-9DF3F51BA10A}">
+      <p15:sldGuideLst xmlns:p15="http://schemas.microsoft.com/office/powerpoint/2012/main"/>
+    </p:ext>
+  </p:extLst>
 </p:presentation>
 </file>
 
@@ -251,7 +259,7 @@
           <a:p>
             <a:fld id="{9B284AA3-C948-4AEF-9698-7E1A93E5B36F}" type="datetimeFigureOut">
               <a:rPr lang="en-US" smtClean="0"/>
-              <a:t>7/18/2015</a:t>
+              <a:t>7/20/2015</a:t>
             </a:fld>
             <a:endParaRPr lang="en-US"/>
           </a:p>
@@ -421,7 +429,7 @@
           <a:p>
             <a:fld id="{9B284AA3-C948-4AEF-9698-7E1A93E5B36F}" type="datetimeFigureOut">
               <a:rPr lang="en-US" smtClean="0"/>
-              <a:t>7/18/2015</a:t>
+              <a:t>7/20/2015</a:t>
             </a:fld>
             <a:endParaRPr lang="en-US"/>
           </a:p>
@@ -601,7 +609,7 @@
           <a:p>
             <a:fld id="{9B284AA3-C948-4AEF-9698-7E1A93E5B36F}" type="datetimeFigureOut">
               <a:rPr lang="en-US" smtClean="0"/>
-              <a:t>7/18/2015</a:t>
+              <a:t>7/20/2015</a:t>
             </a:fld>
             <a:endParaRPr lang="en-US"/>
           </a:p>
@@ -771,7 +779,7 @@
           <a:p>
             <a:fld id="{9B284AA3-C948-4AEF-9698-7E1A93E5B36F}" type="datetimeFigureOut">
               <a:rPr lang="en-US" smtClean="0"/>
-              <a:t>7/18/2015</a:t>
+              <a:t>7/20/2015</a:t>
             </a:fld>
             <a:endParaRPr lang="en-US"/>
           </a:p>
@@ -1017,7 +1025,7 @@
           <a:p>
             <a:fld id="{9B284AA3-C948-4AEF-9698-7E1A93E5B36F}" type="datetimeFigureOut">
               <a:rPr lang="en-US" smtClean="0"/>
-              <a:t>7/18/2015</a:t>
+              <a:t>7/20/2015</a:t>
             </a:fld>
             <a:endParaRPr lang="en-US"/>
           </a:p>
@@ -1249,7 +1257,7 @@
           <a:p>
             <a:fld id="{9B284AA3-C948-4AEF-9698-7E1A93E5B36F}" type="datetimeFigureOut">
               <a:rPr lang="en-US" smtClean="0"/>
-              <a:t>7/18/2015</a:t>
+              <a:t>7/20/2015</a:t>
             </a:fld>
             <a:endParaRPr lang="en-US"/>
           </a:p>
@@ -1616,7 +1624,7 @@
           <a:p>
             <a:fld id="{9B284AA3-C948-4AEF-9698-7E1A93E5B36F}" type="datetimeFigureOut">
               <a:rPr lang="en-US" smtClean="0"/>
-              <a:t>7/18/2015</a:t>
+              <a:t>7/20/2015</a:t>
             </a:fld>
             <a:endParaRPr lang="en-US"/>
           </a:p>
@@ -1734,7 +1742,7 @@
           <a:p>
             <a:fld id="{9B284AA3-C948-4AEF-9698-7E1A93E5B36F}" type="datetimeFigureOut">
               <a:rPr lang="en-US" smtClean="0"/>
-              <a:t>7/18/2015</a:t>
+              <a:t>7/20/2015</a:t>
             </a:fld>
             <a:endParaRPr lang="en-US"/>
           </a:p>
@@ -1829,7 +1837,7 @@
           <a:p>
             <a:fld id="{9B284AA3-C948-4AEF-9698-7E1A93E5B36F}" type="datetimeFigureOut">
               <a:rPr lang="en-US" smtClean="0"/>
-              <a:t>7/18/2015</a:t>
+              <a:t>7/20/2015</a:t>
             </a:fld>
             <a:endParaRPr lang="en-US"/>
           </a:p>
@@ -2106,7 +2114,7 @@
           <a:p>
             <a:fld id="{9B284AA3-C948-4AEF-9698-7E1A93E5B36F}" type="datetimeFigureOut">
               <a:rPr lang="en-US" smtClean="0"/>
-              <a:t>7/18/2015</a:t>
+              <a:t>7/20/2015</a:t>
             </a:fld>
             <a:endParaRPr lang="en-US"/>
           </a:p>
@@ -2359,7 +2367,7 @@
           <a:p>
             <a:fld id="{9B284AA3-C948-4AEF-9698-7E1A93E5B36F}" type="datetimeFigureOut">
               <a:rPr lang="en-US" smtClean="0"/>
-              <a:t>7/18/2015</a:t>
+              <a:t>7/20/2015</a:t>
             </a:fld>
             <a:endParaRPr lang="en-US"/>
           </a:p>
@@ -2572,7 +2580,7 @@
           <a:p>
             <a:fld id="{9B284AA3-C948-4AEF-9698-7E1A93E5B36F}" type="datetimeFigureOut">
               <a:rPr lang="en-US" smtClean="0"/>
-              <a:t>7/18/2015</a:t>
+              <a:t>7/20/2015</a:t>
             </a:fld>
             <a:endParaRPr lang="en-US"/>
           </a:p>
@@ -3065,16 +3073,8 @@
           <a:lstStyle/>
           <a:p>
             <a:r>
-              <a:rPr lang="en-US" dirty="0" err="1" smtClean="0"/>
-              <a:t>Melhores</a:t>
-            </a:r>
-            <a:r>
               <a:rPr lang="en-US" dirty="0" smtClean="0"/>
-              <a:t> </a:t>
-            </a:r>
-            <a:r>
-              <a:rPr lang="en-US" dirty="0" err="1" smtClean="0"/>
-              <a:t>práticas</a:t>
+              <a:t>Routing</a:t>
             </a:r>
             <a:endParaRPr lang="en-US" dirty="0"/>
           </a:p>
@@ -3102,7 +3102,7 @@
     </p:spTree>
     <p:extLst>
       <p:ext uri="{BB962C8B-B14F-4D97-AF65-F5344CB8AC3E}">
-        <p14:creationId xmlns:p14="http://schemas.microsoft.com/office/powerpoint/2010/main" val="2756249304"/>
+        <p14:creationId xmlns:p14="http://schemas.microsoft.com/office/powerpoint/2010/main" val="885337870"/>
       </p:ext>
     </p:extLst>
   </p:cSld>
@@ -3145,12 +3145,8 @@
           <a:lstStyle/>
           <a:p>
             <a:r>
-              <a:rPr lang="en-US" dirty="0" err="1" smtClean="0"/>
-              <a:t>Futuro</a:t>
-            </a:r>
-            <a:r>
               <a:rPr lang="en-US" dirty="0" smtClean="0"/>
-              <a:t> do ASP.NET</a:t>
+              <a:t>Filters</a:t>
             </a:r>
             <a:endParaRPr lang="en-US" dirty="0"/>
           </a:p>
@@ -3178,7 +3174,7 @@
     </p:spTree>
     <p:extLst>
       <p:ext uri="{BB962C8B-B14F-4D97-AF65-F5344CB8AC3E}">
-        <p14:creationId xmlns:p14="http://schemas.microsoft.com/office/powerpoint/2010/main" val="1578753499"/>
+        <p14:creationId xmlns:p14="http://schemas.microsoft.com/office/powerpoint/2010/main" val="4086552586"/>
       </p:ext>
     </p:extLst>
   </p:cSld>
@@ -3222,7 +3218,27 @@
           <a:p>
             <a:r>
               <a:rPr lang="en-US" dirty="0" err="1" smtClean="0"/>
-              <a:t>Ferramentas</a:t>
+              <a:t>Segurança</a:t>
+            </a:r>
+            <a:r>
+              <a:rPr lang="en-US" dirty="0" smtClean="0"/>
+              <a:t>: </a:t>
+            </a:r>
+            <a:r>
+              <a:rPr lang="en-US" dirty="0" err="1" smtClean="0"/>
+              <a:t>autorização</a:t>
+            </a:r>
+            <a:r>
+              <a:rPr lang="en-US" dirty="0" smtClean="0"/>
+              <a:t> </a:t>
+            </a:r>
+            <a:r>
+              <a:rPr lang="en-US" dirty="0" smtClean="0"/>
+              <a:t>e </a:t>
+            </a:r>
+            <a:r>
+              <a:rPr lang="en-US" dirty="0" err="1" smtClean="0"/>
+              <a:t>autenticação</a:t>
             </a:r>
             <a:endParaRPr lang="en-US" dirty="0"/>
           </a:p>
@@ -3243,14 +3259,18 @@
           <a:bodyPr/>
           <a:lstStyle/>
           <a:p>
-            <a:endParaRPr lang="en-US"/>
+            <a:r>
+              <a:rPr lang="en-US" dirty="0" smtClean="0"/>
+              <a:t>ASP.NET Identity</a:t>
+            </a:r>
+            <a:endParaRPr lang="en-US" dirty="0"/>
           </a:p>
         </p:txBody>
       </p:sp>
     </p:spTree>
     <p:extLst>
       <p:ext uri="{BB962C8B-B14F-4D97-AF65-F5344CB8AC3E}">
-        <p14:creationId xmlns:p14="http://schemas.microsoft.com/office/powerpoint/2010/main" val="2473890283"/>
+        <p14:creationId xmlns:p14="http://schemas.microsoft.com/office/powerpoint/2010/main" val="3226619820"/>
       </p:ext>
     </p:extLst>
   </p:cSld>
@@ -3293,8 +3313,8 @@
           <a:lstStyle/>
           <a:p>
             <a:r>
-              <a:rPr lang="en-US" dirty="0" err="1" smtClean="0"/>
-              <a:t>Considerações</a:t>
+              <a:rPr lang="en-US" dirty="0" smtClean="0"/>
+              <a:t>Hands-On</a:t>
             </a:r>
             <a:endParaRPr lang="en-US" dirty="0"/>
           </a:p>
@@ -3322,7 +3342,7 @@
     </p:spTree>
     <p:extLst>
       <p:ext uri="{BB962C8B-B14F-4D97-AF65-F5344CB8AC3E}">
-        <p14:creationId xmlns:p14="http://schemas.microsoft.com/office/powerpoint/2010/main" val="1782215375"/>
+        <p14:creationId xmlns:p14="http://schemas.microsoft.com/office/powerpoint/2010/main" val="2756249304"/>
       </p:ext>
     </p:extLst>
   </p:cSld>
@@ -3366,31 +3386,119 @@
           <a:p>
             <a:r>
               <a:rPr lang="en-US" dirty="0" err="1" smtClean="0"/>
+              <a:t>Futuro</a:t>
+            </a:r>
+            <a:r>
+              <a:rPr lang="en-US" dirty="0" smtClean="0"/>
+              <a:t> do ASP.NET</a:t>
+            </a:r>
+            <a:endParaRPr lang="en-US" dirty="0"/>
+          </a:p>
+        </p:txBody>
+      </p:sp>
+      <p:sp>
+        <p:nvSpPr>
+          <p:cNvPr id="3" name="Content Placeholder 2"/>
+          <p:cNvSpPr>
+            <a:spLocks noGrp="1"/>
+          </p:cNvSpPr>
+          <p:nvPr>
+            <p:ph idx="1"/>
+          </p:nvPr>
+        </p:nvSpPr>
+        <p:spPr/>
+        <p:txBody>
+          <a:bodyPr/>
+          <a:lstStyle/>
+          <a:p>
+            <a:endParaRPr lang="en-US"/>
+          </a:p>
+        </p:txBody>
+      </p:sp>
+    </p:spTree>
+    <p:extLst>
+      <p:ext uri="{BB962C8B-B14F-4D97-AF65-F5344CB8AC3E}">
+        <p14:creationId xmlns:p14="http://schemas.microsoft.com/office/powerpoint/2010/main" val="1578753499"/>
+      </p:ext>
+    </p:extLst>
+  </p:cSld>
+  <p:clrMapOvr>
+    <a:masterClrMapping/>
+  </p:clrMapOvr>
+</p:sld>
+</file>
+
+<file path=ppt/slides/slide15.xml><?xml version="1.0" encoding="utf-8"?>
+<p:sld xmlns:a="http://schemas.openxmlformats.org/drawingml/2006/main" xmlns:r="http://schemas.openxmlformats.org/officeDocument/2006/relationships" xmlns:p="http://schemas.openxmlformats.org/presentationml/2006/main">
+  <p:cSld>
+    <p:spTree>
+      <p:nvGrpSpPr>
+        <p:cNvPr id="1" name=""/>
+        <p:cNvGrpSpPr/>
+        <p:nvPr/>
+      </p:nvGrpSpPr>
+      <p:grpSpPr>
+        <a:xfrm>
+          <a:off x="0" y="0"/>
+          <a:ext cx="0" cy="0"/>
+          <a:chOff x="0" y="0"/>
+          <a:chExt cx="0" cy="0"/>
+        </a:xfrm>
+      </p:grpSpPr>
+      <p:sp>
+        <p:nvSpPr>
+          <p:cNvPr id="2" name="Title 1"/>
+          <p:cNvSpPr>
+            <a:spLocks noGrp="1"/>
+          </p:cNvSpPr>
+          <p:nvPr>
+            <p:ph type="title"/>
+          </p:nvPr>
+        </p:nvSpPr>
+        <p:spPr/>
+        <p:txBody>
+          <a:bodyPr/>
+          <a:lstStyle/>
+          <a:p>
+            <a:r>
+              <a:rPr lang="en-US" dirty="0" err="1" smtClean="0"/>
+              <a:t>Melhores</a:t>
+            </a:r>
+            <a:r>
+              <a:rPr lang="en-US" dirty="0" smtClean="0"/>
+              <a:t> </a:t>
+            </a:r>
+            <a:r>
+              <a:rPr lang="en-US" dirty="0" err="1" smtClean="0"/>
+              <a:t>práticas</a:t>
+            </a:r>
+            <a:endParaRPr lang="en-US" dirty="0"/>
+          </a:p>
+        </p:txBody>
+      </p:sp>
+      <p:sp>
+        <p:nvSpPr>
+          <p:cNvPr id="3" name="Content Placeholder 2"/>
+          <p:cNvSpPr>
+            <a:spLocks noGrp="1"/>
+          </p:cNvSpPr>
+          <p:nvPr>
+            <p:ph idx="1"/>
+          </p:nvPr>
+        </p:nvSpPr>
+        <p:spPr/>
+        <p:txBody>
+          <a:bodyPr/>
+          <a:lstStyle/>
+          <a:p>
+            <a:r>
+              <a:rPr lang="en-US" dirty="0" err="1"/>
               <a:t>Não</a:t>
             </a:r>
             <a:r>
-              <a:rPr lang="en-US" dirty="0" smtClean="0"/>
+              <a:rPr lang="en-US" dirty="0"/>
               <a:t> use session</a:t>
             </a:r>
-            <a:endParaRPr lang="en-US" dirty="0"/>
-          </a:p>
-        </p:txBody>
-      </p:sp>
-      <p:sp>
-        <p:nvSpPr>
-          <p:cNvPr id="3" name="Content Placeholder 2"/>
-          <p:cNvSpPr>
-            <a:spLocks noGrp="1"/>
-          </p:cNvSpPr>
-          <p:nvPr>
-            <p:ph idx="1"/>
-          </p:nvPr>
-        </p:nvSpPr>
-        <p:spPr/>
-        <p:txBody>
-          <a:bodyPr/>
-          <a:lstStyle/>
-          <a:p>
             <a:endParaRPr lang="en-US" dirty="0"/>
           </a:p>
         </p:txBody>
@@ -3399,6 +3507,266 @@
     <p:extLst>
       <p:ext uri="{BB962C8B-B14F-4D97-AF65-F5344CB8AC3E}">
         <p14:creationId xmlns:p14="http://schemas.microsoft.com/office/powerpoint/2010/main" val="1200062970"/>
+      </p:ext>
+    </p:extLst>
+  </p:cSld>
+  <p:clrMapOvr>
+    <a:masterClrMapping/>
+  </p:clrMapOvr>
+</p:sld>
+</file>
+
+<file path=ppt/slides/slide16.xml><?xml version="1.0" encoding="utf-8"?>
+<p:sld xmlns:a="http://schemas.openxmlformats.org/drawingml/2006/main" xmlns:r="http://schemas.openxmlformats.org/officeDocument/2006/relationships" xmlns:p="http://schemas.openxmlformats.org/presentationml/2006/main">
+  <p:cSld>
+    <p:spTree>
+      <p:nvGrpSpPr>
+        <p:cNvPr id="1" name=""/>
+        <p:cNvGrpSpPr/>
+        <p:nvPr/>
+      </p:nvGrpSpPr>
+      <p:grpSpPr>
+        <a:xfrm>
+          <a:off x="0" y="0"/>
+          <a:ext cx="0" cy="0"/>
+          <a:chOff x="0" y="0"/>
+          <a:chExt cx="0" cy="0"/>
+        </a:xfrm>
+      </p:grpSpPr>
+      <p:sp>
+        <p:nvSpPr>
+          <p:cNvPr id="2" name="Title 1"/>
+          <p:cNvSpPr>
+            <a:spLocks noGrp="1"/>
+          </p:cNvSpPr>
+          <p:nvPr>
+            <p:ph type="title"/>
+          </p:nvPr>
+        </p:nvSpPr>
+        <p:spPr/>
+        <p:txBody>
+          <a:bodyPr/>
+          <a:lstStyle/>
+          <a:p>
+            <a:r>
+              <a:rPr lang="en-US" dirty="0" err="1" smtClean="0"/>
+              <a:t>Ferramentas</a:t>
+            </a:r>
+            <a:endParaRPr lang="en-US" dirty="0"/>
+          </a:p>
+        </p:txBody>
+      </p:sp>
+      <p:sp>
+        <p:nvSpPr>
+          <p:cNvPr id="3" name="Content Placeholder 2"/>
+          <p:cNvSpPr>
+            <a:spLocks noGrp="1"/>
+          </p:cNvSpPr>
+          <p:nvPr>
+            <p:ph idx="1"/>
+          </p:nvPr>
+        </p:nvSpPr>
+        <p:spPr>
+          <a:xfrm>
+            <a:off x="838200" y="1472056"/>
+            <a:ext cx="10515600" cy="5038471"/>
+          </a:xfrm>
+        </p:spPr>
+        <p:txBody>
+          <a:bodyPr>
+            <a:normAutofit fontScale="85000" lnSpcReduction="20000"/>
+          </a:bodyPr>
+          <a:lstStyle/>
+          <a:p>
+            <a:r>
+              <a:rPr lang="en-US" dirty="0" smtClean="0"/>
+              <a:t>Log4net </a:t>
+            </a:r>
+            <a:r>
+              <a:rPr lang="en-US" dirty="0" err="1" smtClean="0"/>
+              <a:t>ou</a:t>
+            </a:r>
+            <a:r>
+              <a:rPr lang="en-US" dirty="0" smtClean="0"/>
+              <a:t> </a:t>
+            </a:r>
+            <a:r>
+              <a:rPr lang="en-US" dirty="0" err="1" smtClean="0"/>
+              <a:t>Elmah</a:t>
+            </a:r>
+            <a:endParaRPr lang="en-US" dirty="0" smtClean="0"/>
+          </a:p>
+          <a:p>
+            <a:r>
+              <a:rPr lang="en-US" dirty="0" smtClean="0"/>
+              <a:t>Fluent Security</a:t>
+            </a:r>
+          </a:p>
+          <a:p>
+            <a:r>
+              <a:rPr lang="en-US" dirty="0" smtClean="0"/>
+              <a:t>Fluent Validation</a:t>
+            </a:r>
+          </a:p>
+          <a:p>
+            <a:r>
+              <a:rPr lang="en-US" smtClean="0"/>
+              <a:t>Flurl</a:t>
+            </a:r>
+            <a:endParaRPr lang="en-US" dirty="0" smtClean="0"/>
+          </a:p>
+          <a:p>
+            <a:r>
+              <a:rPr lang="en-US" dirty="0" smtClean="0"/>
+              <a:t>ORMs</a:t>
+            </a:r>
+          </a:p>
+          <a:p>
+            <a:pPr lvl="1"/>
+            <a:r>
+              <a:rPr lang="en-US" dirty="0" smtClean="0"/>
+              <a:t>Entity Framework</a:t>
+            </a:r>
+          </a:p>
+          <a:p>
+            <a:pPr lvl="1"/>
+            <a:r>
+              <a:rPr lang="en-US" dirty="0" err="1" smtClean="0"/>
+              <a:t>Nhibernate</a:t>
+            </a:r>
+            <a:endParaRPr lang="en-US" dirty="0" smtClean="0"/>
+          </a:p>
+          <a:p>
+            <a:pPr lvl="1"/>
+            <a:r>
+              <a:rPr lang="en-US" dirty="0" smtClean="0"/>
+              <a:t>Micro ORMs</a:t>
+            </a:r>
+          </a:p>
+          <a:p>
+            <a:pPr lvl="2"/>
+            <a:r>
+              <a:rPr lang="en-US" dirty="0"/>
+              <a:t>Dapper</a:t>
+            </a:r>
+            <a:endParaRPr lang="en-US" dirty="0"/>
+          </a:p>
+          <a:p>
+            <a:pPr lvl="2"/>
+            <a:r>
+              <a:rPr lang="en-US" dirty="0" err="1" smtClean="0"/>
+              <a:t>PetaPoco</a:t>
+            </a:r>
+            <a:endParaRPr lang="en-US" dirty="0"/>
+          </a:p>
+          <a:p>
+            <a:pPr lvl="2"/>
+            <a:r>
+              <a:rPr lang="en-US" dirty="0" err="1" smtClean="0"/>
+              <a:t>OrmLite</a:t>
+            </a:r>
+            <a:endParaRPr lang="en-US" dirty="0" smtClean="0"/>
+          </a:p>
+          <a:p>
+            <a:r>
+              <a:rPr lang="en-US" dirty="0" smtClean="0"/>
+              <a:t>Auto mapper</a:t>
+            </a:r>
+            <a:endParaRPr lang="en-US" dirty="0"/>
+          </a:p>
+          <a:p>
+            <a:r>
+              <a:rPr lang="en-US" dirty="0" smtClean="0"/>
+              <a:t>Cache</a:t>
+            </a:r>
+          </a:p>
+          <a:p>
+            <a:pPr lvl="1"/>
+            <a:r>
+              <a:rPr lang="en-US" dirty="0" err="1" smtClean="0"/>
+              <a:t>Redis</a:t>
+            </a:r>
+            <a:endParaRPr lang="en-US" dirty="0" smtClean="0"/>
+          </a:p>
+          <a:p>
+            <a:pPr lvl="1"/>
+            <a:r>
+              <a:rPr lang="en-US" dirty="0" err="1" smtClean="0"/>
+              <a:t>MainCache</a:t>
+            </a:r>
+            <a:endParaRPr lang="en-US" dirty="0" smtClean="0"/>
+          </a:p>
+          <a:p>
+            <a:endParaRPr lang="en-US" dirty="0"/>
+          </a:p>
+        </p:txBody>
+      </p:sp>
+    </p:spTree>
+    <p:extLst>
+      <p:ext uri="{BB962C8B-B14F-4D97-AF65-F5344CB8AC3E}">
+        <p14:creationId xmlns:p14="http://schemas.microsoft.com/office/powerpoint/2010/main" val="2473890283"/>
+      </p:ext>
+    </p:extLst>
+  </p:cSld>
+  <p:clrMapOvr>
+    <a:masterClrMapping/>
+  </p:clrMapOvr>
+</p:sld>
+</file>
+
+<file path=ppt/slides/slide17.xml><?xml version="1.0" encoding="utf-8"?>
+<p:sld xmlns:a="http://schemas.openxmlformats.org/drawingml/2006/main" xmlns:r="http://schemas.openxmlformats.org/officeDocument/2006/relationships" xmlns:p="http://schemas.openxmlformats.org/presentationml/2006/main">
+  <p:cSld>
+    <p:spTree>
+      <p:nvGrpSpPr>
+        <p:cNvPr id="1" name=""/>
+        <p:cNvGrpSpPr/>
+        <p:nvPr/>
+      </p:nvGrpSpPr>
+      <p:grpSpPr>
+        <a:xfrm>
+          <a:off x="0" y="0"/>
+          <a:ext cx="0" cy="0"/>
+          <a:chOff x="0" y="0"/>
+          <a:chExt cx="0" cy="0"/>
+        </a:xfrm>
+      </p:grpSpPr>
+      <p:sp>
+        <p:nvSpPr>
+          <p:cNvPr id="2" name="Title 1"/>
+          <p:cNvSpPr>
+            <a:spLocks noGrp="1"/>
+          </p:cNvSpPr>
+          <p:nvPr>
+            <p:ph type="title"/>
+          </p:nvPr>
+        </p:nvSpPr>
+        <p:spPr>
+          <a:xfrm>
+            <a:off x="813816" y="2815717"/>
+            <a:ext cx="10515600" cy="1325563"/>
+          </a:xfrm>
+        </p:spPr>
+        <p:txBody>
+          <a:bodyPr/>
+          <a:lstStyle/>
+          <a:p>
+            <a:r>
+              <a:rPr lang="en-US" dirty="0" err="1" smtClean="0"/>
+              <a:t>Perguntas</a:t>
+            </a:r>
+            <a:r>
+              <a:rPr lang="en-US" dirty="0" smtClean="0"/>
+              <a:t>?</a:t>
+            </a:r>
+            <a:endParaRPr lang="en-US" dirty="0"/>
+          </a:p>
+        </p:txBody>
+      </p:sp>
+    </p:spTree>
+    <p:extLst>
+      <p:ext uri="{BB962C8B-B14F-4D97-AF65-F5344CB8AC3E}">
+        <p14:creationId xmlns:p14="http://schemas.microsoft.com/office/powerpoint/2010/main" val="3832291747"/>
       </p:ext>
     </p:extLst>
   </p:cSld>
@@ -3473,105 +3841,277 @@
         </p:spPr>
         <p:txBody>
           <a:bodyPr>
-            <a:normAutofit/>
+            <a:noAutofit/>
           </a:bodyPr>
           <a:lstStyle/>
           <a:p>
             <a:r>
-              <a:rPr lang="en-US" sz="2400" dirty="0" err="1" smtClean="0"/>
+              <a:rPr lang="en-US" sz="1600" dirty="0" err="1" smtClean="0"/>
+              <a:t>Introdução</a:t>
+            </a:r>
+            <a:r>
+              <a:rPr lang="en-US" sz="1600" dirty="0" smtClean="0"/>
+              <a:t> 1hr</a:t>
+            </a:r>
+          </a:p>
+          <a:p>
+            <a:pPr lvl="1"/>
+            <a:r>
+              <a:rPr lang="en-US" sz="1600" dirty="0" err="1" smtClean="0"/>
               <a:t>Padrão</a:t>
             </a:r>
             <a:r>
-              <a:rPr lang="en-US" sz="2400" dirty="0" smtClean="0"/>
-              <a:t> MVC</a:t>
-            </a:r>
-          </a:p>
-          <a:p>
-            <a:r>
-              <a:rPr lang="en-US" sz="2400" dirty="0" smtClean="0"/>
-              <a:t>ASP.NET</a:t>
-            </a:r>
-          </a:p>
-          <a:p>
-            <a:r>
-              <a:rPr lang="en-US" sz="2400" dirty="0" smtClean="0"/>
-              <a:t>Controllers</a:t>
-            </a:r>
-          </a:p>
-          <a:p>
-            <a:r>
-              <a:rPr lang="en-US" sz="2400" dirty="0" smtClean="0"/>
-              <a:t>Views</a:t>
-            </a:r>
-          </a:p>
-          <a:p>
-            <a:r>
-              <a:rPr lang="en-US" sz="2400" dirty="0" smtClean="0"/>
-              <a:t>Models</a:t>
-            </a:r>
-          </a:p>
-          <a:p>
-            <a:r>
-              <a:rPr lang="en-US" sz="2400" dirty="0" smtClean="0"/>
-              <a:t>Action Filters</a:t>
-            </a:r>
-          </a:p>
-          <a:p>
-            <a:r>
-              <a:rPr lang="en-US" sz="2400" dirty="0" err="1" smtClean="0"/>
+              <a:rPr lang="en-US" sz="1600" dirty="0" smtClean="0"/>
+              <a:t> MVC 20min</a:t>
+            </a:r>
+          </a:p>
+          <a:p>
+            <a:pPr lvl="1"/>
+            <a:r>
+              <a:rPr lang="en-US" sz="1600" dirty="0" smtClean="0"/>
+              <a:t>ASP.NET 20min</a:t>
+            </a:r>
+          </a:p>
+          <a:p>
+            <a:pPr lvl="2"/>
+            <a:r>
+              <a:rPr lang="en-US" sz="1600" dirty="0" err="1" smtClean="0"/>
+              <a:t>Plataforma</a:t>
+            </a:r>
+            <a:r>
+              <a:rPr lang="en-US" sz="1600" dirty="0" smtClean="0"/>
+              <a:t> Web </a:t>
+            </a:r>
+            <a:endParaRPr lang="en-US" sz="1600" dirty="0" smtClean="0"/>
+          </a:p>
+          <a:p>
+            <a:pPr lvl="2"/>
+            <a:r>
+              <a:rPr lang="en-US" sz="1600" dirty="0" smtClean="0"/>
+              <a:t>Web Forms</a:t>
+            </a:r>
+          </a:p>
+          <a:p>
+            <a:r>
+              <a:rPr lang="en-US" sz="1600" dirty="0" err="1" smtClean="0"/>
+              <a:t>Meio</a:t>
+            </a:r>
+            <a:r>
+              <a:rPr lang="en-US" sz="1600" dirty="0" smtClean="0"/>
+              <a:t> 5hr</a:t>
+            </a:r>
+          </a:p>
+          <a:p>
+            <a:pPr lvl="1"/>
+            <a:r>
+              <a:rPr lang="en-US" sz="1600" dirty="0" err="1" smtClean="0">
+                <a:solidFill>
+                  <a:srgbClr val="FF0000"/>
+                </a:solidFill>
+              </a:rPr>
+              <a:t>Básico</a:t>
+            </a:r>
+            <a:endParaRPr lang="en-US" sz="1600" dirty="0" smtClean="0">
+              <a:solidFill>
+                <a:srgbClr val="FF0000"/>
+              </a:solidFill>
+            </a:endParaRPr>
+          </a:p>
+          <a:p>
+            <a:pPr lvl="2"/>
+            <a:r>
+              <a:rPr lang="en-US" sz="1400" dirty="0">
+                <a:solidFill>
+                  <a:srgbClr val="FF0000"/>
+                </a:solidFill>
+              </a:rPr>
+              <a:t>Views </a:t>
+            </a:r>
+            <a:r>
+              <a:rPr lang="en-US" sz="1200" dirty="0" smtClean="0">
+                <a:solidFill>
+                  <a:srgbClr val="FF0000"/>
+                </a:solidFill>
+              </a:rPr>
+              <a:t>1hr</a:t>
+            </a:r>
+          </a:p>
+          <a:p>
+            <a:pPr lvl="2"/>
+            <a:r>
+              <a:rPr lang="en-US" sz="1600" dirty="0" smtClean="0">
+                <a:solidFill>
+                  <a:srgbClr val="FF0000"/>
+                </a:solidFill>
+              </a:rPr>
+              <a:t>Controllers 1hr</a:t>
+            </a:r>
+          </a:p>
+          <a:p>
+            <a:pPr lvl="3"/>
+            <a:r>
+              <a:rPr lang="en-US" sz="1400" dirty="0" err="1" smtClean="0">
+                <a:solidFill>
+                  <a:srgbClr val="FF0000"/>
+                </a:solidFill>
+              </a:rPr>
+              <a:t>Armazenamento</a:t>
+            </a:r>
+            <a:r>
+              <a:rPr lang="en-US" sz="1400" dirty="0" smtClean="0">
+                <a:solidFill>
+                  <a:srgbClr val="FF0000"/>
+                </a:solidFill>
+              </a:rPr>
+              <a:t> Web (Session, </a:t>
+            </a:r>
+            <a:r>
+              <a:rPr lang="en-US" sz="1400" dirty="0" err="1" smtClean="0">
+                <a:solidFill>
+                  <a:srgbClr val="FF0000"/>
+                </a:solidFill>
+              </a:rPr>
+              <a:t>TempData</a:t>
+            </a:r>
+            <a:r>
+              <a:rPr lang="en-US" sz="1400" dirty="0" smtClean="0">
+                <a:solidFill>
+                  <a:srgbClr val="FF0000"/>
+                </a:solidFill>
+              </a:rPr>
+              <a:t>, etc…)</a:t>
+            </a:r>
+          </a:p>
+          <a:p>
+            <a:pPr lvl="3"/>
+            <a:r>
+              <a:rPr lang="en-US" sz="1400" dirty="0" smtClean="0">
+                <a:solidFill>
+                  <a:srgbClr val="FF0000"/>
+                </a:solidFill>
+              </a:rPr>
+              <a:t>Actions</a:t>
+            </a:r>
+          </a:p>
+          <a:p>
+            <a:pPr lvl="2"/>
+            <a:r>
+              <a:rPr lang="en-US" sz="1600" dirty="0" smtClean="0">
+                <a:solidFill>
+                  <a:srgbClr val="FF0000"/>
+                </a:solidFill>
+              </a:rPr>
+              <a:t>Models 1hr</a:t>
+            </a:r>
+          </a:p>
+          <a:p>
+            <a:pPr lvl="2"/>
+            <a:r>
+              <a:rPr lang="en-US" sz="1600" dirty="0" smtClean="0">
+                <a:solidFill>
+                  <a:srgbClr val="FF0000"/>
+                </a:solidFill>
+              </a:rPr>
+              <a:t>Routing 1hr</a:t>
+            </a:r>
+          </a:p>
+          <a:p>
+            <a:pPr lvl="1"/>
+            <a:r>
+              <a:rPr lang="en-US" sz="1600" dirty="0" err="1" smtClean="0"/>
+              <a:t>Avançado</a:t>
+            </a:r>
+            <a:endParaRPr lang="en-US" sz="1600" dirty="0" smtClean="0"/>
+          </a:p>
+          <a:p>
+            <a:pPr lvl="2"/>
+            <a:r>
+              <a:rPr lang="en-US" sz="1600" dirty="0" smtClean="0"/>
+              <a:t>Action Filters 30min</a:t>
+            </a:r>
+          </a:p>
+          <a:p>
+            <a:pPr lvl="2"/>
+            <a:r>
+              <a:rPr lang="en-US" sz="1600" dirty="0" err="1" smtClean="0"/>
               <a:t>Autenticação</a:t>
             </a:r>
             <a:r>
-              <a:rPr lang="en-US" sz="2400" dirty="0" smtClean="0"/>
+              <a:rPr lang="en-US" sz="1600" dirty="0" smtClean="0"/>
               <a:t> e </a:t>
             </a:r>
             <a:r>
-              <a:rPr lang="en-US" sz="2400" dirty="0" err="1" smtClean="0"/>
+              <a:rPr lang="en-US" sz="1600" dirty="0" err="1" smtClean="0"/>
               <a:t>autorização</a:t>
             </a:r>
-            <a:endParaRPr lang="en-US" sz="2400" dirty="0" smtClean="0"/>
-          </a:p>
-          <a:p>
-            <a:r>
-              <a:rPr lang="en-US" sz="2400" dirty="0" err="1" smtClean="0"/>
+            <a:r>
+              <a:rPr lang="en-US" sz="1600" dirty="0" smtClean="0"/>
+              <a:t> 30min</a:t>
+            </a:r>
+          </a:p>
+          <a:p>
+            <a:pPr lvl="1"/>
+            <a:r>
+              <a:rPr lang="en-US" sz="1600" dirty="0" err="1" smtClean="0"/>
+              <a:t>Exemplo</a:t>
+            </a:r>
+            <a:r>
+              <a:rPr lang="en-US" sz="1600" dirty="0" smtClean="0"/>
+              <a:t> </a:t>
+            </a:r>
+            <a:r>
+              <a:rPr lang="en-US" sz="1600" dirty="0" err="1" smtClean="0"/>
+              <a:t>Prático</a:t>
+            </a:r>
+            <a:r>
+              <a:rPr lang="en-US" sz="1600" dirty="0" smtClean="0"/>
+              <a:t> 1hr</a:t>
+            </a:r>
+          </a:p>
+          <a:p>
+            <a:r>
+              <a:rPr lang="en-US" sz="1600" dirty="0" err="1" smtClean="0"/>
+              <a:t>Conclusão</a:t>
+            </a:r>
+            <a:r>
+              <a:rPr lang="en-US" sz="1600" dirty="0" smtClean="0"/>
+              <a:t> 1hr</a:t>
+            </a:r>
+          </a:p>
+          <a:p>
+            <a:pPr lvl="1"/>
+            <a:r>
+              <a:rPr lang="en-US" sz="1600" dirty="0" err="1"/>
               <a:t>Melhores</a:t>
             </a:r>
             <a:r>
-              <a:rPr lang="en-US" sz="2400" dirty="0" smtClean="0"/>
+              <a:rPr lang="en-US" sz="1600" dirty="0"/>
               <a:t> </a:t>
             </a:r>
             <a:r>
-              <a:rPr lang="en-US" sz="2400" dirty="0" err="1" smtClean="0"/>
+              <a:rPr lang="en-US" sz="1600" dirty="0" err="1" smtClean="0"/>
               <a:t>práticas</a:t>
             </a:r>
-            <a:endParaRPr lang="en-US" sz="2400" dirty="0" smtClean="0"/>
-          </a:p>
-          <a:p>
-            <a:r>
-              <a:rPr lang="en-US" sz="2400" dirty="0" err="1" smtClean="0"/>
+            <a:endParaRPr lang="en-US" sz="1600" dirty="0" smtClean="0"/>
+          </a:p>
+          <a:p>
+            <a:pPr lvl="1"/>
+            <a:r>
+              <a:rPr lang="en-US" sz="1600" dirty="0" err="1" smtClean="0"/>
               <a:t>Futuro</a:t>
             </a:r>
             <a:r>
-              <a:rPr lang="en-US" sz="2400" dirty="0" smtClean="0"/>
+              <a:rPr lang="en-US" sz="1600" dirty="0" smtClean="0"/>
               <a:t> do ASP. NET</a:t>
             </a:r>
           </a:p>
           <a:p>
-            <a:r>
-              <a:rPr lang="en-US" sz="2400" dirty="0" err="1" smtClean="0"/>
+            <a:pPr lvl="1"/>
+            <a:r>
+              <a:rPr lang="en-US" sz="1600" dirty="0" err="1" smtClean="0"/>
               <a:t>Ferramentas</a:t>
             </a:r>
-            <a:endParaRPr lang="en-US" sz="2400" dirty="0" smtClean="0"/>
-          </a:p>
-          <a:p>
-            <a:r>
-              <a:rPr lang="en-US" sz="2400" dirty="0" err="1" smtClean="0"/>
-              <a:t>Considerações</a:t>
-            </a:r>
-            <a:endParaRPr lang="en-US" sz="2400" dirty="0" smtClean="0"/>
-          </a:p>
-          <a:p>
-            <a:endParaRPr lang="en-US" sz="2400" dirty="0"/>
+            <a:endParaRPr lang="en-US" sz="1600" dirty="0" smtClean="0"/>
           </a:p>
         </p:txBody>
       </p:sp>
@@ -3615,50 +4155,102 @@
             <p:ph type="title"/>
           </p:nvPr>
         </p:nvSpPr>
-        <p:spPr/>
-        <p:txBody>
-          <a:bodyPr/>
-          <a:lstStyle/>
-          <a:p>
+        <p:spPr>
+          <a:xfrm>
+            <a:off x="838200" y="0"/>
+            <a:ext cx="10515600" cy="1325563"/>
+          </a:xfrm>
+        </p:spPr>
+        <p:txBody>
+          <a:bodyPr/>
+          <a:lstStyle/>
+          <a:p>
+            <a:r>
+              <a:rPr lang="en-US" dirty="0" err="1" smtClean="0"/>
+              <a:t>Plataforma</a:t>
+            </a:r>
             <a:r>
               <a:rPr lang="en-US" dirty="0" smtClean="0"/>
-              <a:t>O </a:t>
-            </a:r>
-            <a:r>
-              <a:rPr lang="en-US" dirty="0" err="1" smtClean="0"/>
-              <a:t>Padrão</a:t>
-            </a:r>
-            <a:r>
-              <a:rPr lang="en-US" dirty="0" smtClean="0"/>
-              <a:t> MVC	</a:t>
+              <a:t> ASP.NET</a:t>
             </a:r>
             <a:endParaRPr lang="en-US" dirty="0"/>
           </a:p>
         </p:txBody>
       </p:sp>
-      <p:sp>
-        <p:nvSpPr>
-          <p:cNvPr id="3" name="Content Placeholder 2"/>
-          <p:cNvSpPr>
-            <a:spLocks noGrp="1"/>
-          </p:cNvSpPr>
+      <p:pic>
+        <p:nvPicPr>
+          <p:cNvPr id="4" name="Content Placeholder 3" descr="image"/>
+          <p:cNvPicPr>
+            <a:picLocks noGrp="1"/>
+          </p:cNvPicPr>
           <p:nvPr>
             <p:ph idx="1"/>
           </p:nvPr>
-        </p:nvSpPr>
-        <p:spPr/>
-        <p:txBody>
-          <a:bodyPr/>
-          <a:lstStyle/>
-          <a:p>
-            <a:endParaRPr lang="en-US"/>
-          </a:p>
-        </p:txBody>
-      </p:sp>
+        </p:nvPicPr>
+        <p:blipFill>
+          <a:blip r:embed="rId2">
+            <a:extLst>
+              <a:ext uri="{28A0092B-C50C-407E-A947-70E740481C1C}">
+                <a14:useLocalDpi xmlns:a14="http://schemas.microsoft.com/office/drawing/2010/main" val="0"/>
+              </a:ext>
+            </a:extLst>
+          </a:blip>
+          <a:srcRect/>
+          <a:stretch>
+            <a:fillRect/>
+          </a:stretch>
+        </p:blipFill>
+        <p:spPr bwMode="auto">
+          <a:xfrm>
+            <a:off x="838200" y="1284502"/>
+            <a:ext cx="6489963" cy="4311626"/>
+          </a:xfrm>
+          <a:prstGeom prst="rect">
+            <a:avLst/>
+          </a:prstGeom>
+          <a:noFill/>
+          <a:ln>
+            <a:noFill/>
+          </a:ln>
+        </p:spPr>
+      </p:pic>
+      <p:pic>
+        <p:nvPicPr>
+          <p:cNvPr id="5" name="Picture 4" descr="AspnetCoreStack"/>
+          <p:cNvPicPr/>
+          <p:nvPr/>
+        </p:nvPicPr>
+        <p:blipFill>
+          <a:blip r:embed="rId3">
+            <a:extLst>
+              <a:ext uri="{28A0092B-C50C-407E-A947-70E740481C1C}">
+                <a14:useLocalDpi xmlns:a14="http://schemas.microsoft.com/office/drawing/2010/main" val="0"/>
+              </a:ext>
+            </a:extLst>
+          </a:blip>
+          <a:srcRect/>
+          <a:stretch>
+            <a:fillRect/>
+          </a:stretch>
+        </p:blipFill>
+        <p:spPr bwMode="auto">
+          <a:xfrm>
+            <a:off x="7971862" y="1284502"/>
+            <a:ext cx="3675317" cy="5213834"/>
+          </a:xfrm>
+          <a:prstGeom prst="rect">
+            <a:avLst/>
+          </a:prstGeom>
+          <a:noFill/>
+          <a:ln>
+            <a:noFill/>
+          </a:ln>
+        </p:spPr>
+      </p:pic>
     </p:spTree>
     <p:extLst>
       <p:ext uri="{BB962C8B-B14F-4D97-AF65-F5344CB8AC3E}">
-        <p14:creationId xmlns:p14="http://schemas.microsoft.com/office/powerpoint/2010/main" val="449919095"/>
+        <p14:creationId xmlns:p14="http://schemas.microsoft.com/office/powerpoint/2010/main" val="2858259401"/>
       </p:ext>
     </p:extLst>
   </p:cSld>
@@ -3702,7 +4294,15 @@
           <a:p>
             <a:r>
               <a:rPr lang="en-US" dirty="0" smtClean="0"/>
-              <a:t>ASP. NET MVC</a:t>
+              <a:t>O </a:t>
+            </a:r>
+            <a:r>
+              <a:rPr lang="en-US" dirty="0" err="1" smtClean="0"/>
+              <a:t>Padrão</a:t>
+            </a:r>
+            <a:r>
+              <a:rPr lang="en-US" dirty="0" smtClean="0"/>
+              <a:t> MVC	</a:t>
             </a:r>
             <a:endParaRPr lang="en-US" dirty="0"/>
           </a:p>
@@ -3710,7 +4310,7 @@
       </p:sp>
       <p:sp>
         <p:nvSpPr>
-          <p:cNvPr id="3" name="Content Placeholder 2"/>
+          <p:cNvPr id="5" name="Content Placeholder 4"/>
           <p:cNvSpPr>
             <a:spLocks noGrp="1"/>
           </p:cNvSpPr>
@@ -3718,19 +4318,46 @@
             <p:ph idx="1"/>
           </p:nvPr>
         </p:nvSpPr>
-        <p:spPr/>
-        <p:txBody>
-          <a:bodyPr/>
-          <a:lstStyle/>
-          <a:p>
-            <a:endParaRPr lang="en-US"/>
-          </a:p>
-        </p:txBody>
-      </p:sp>
+        <p:spPr>
+          <a:xfrm>
+            <a:off x="838200" y="1825625"/>
+            <a:ext cx="5877845" cy="4351338"/>
+          </a:xfrm>
+        </p:spPr>
+        <p:txBody>
+          <a:bodyPr/>
+          <a:lstStyle/>
+          <a:p>
+            <a:endParaRPr lang="en-US" dirty="0"/>
+          </a:p>
+        </p:txBody>
+      </p:sp>
+      <p:pic>
+        <p:nvPicPr>
+          <p:cNvPr id="6" name="Picture 5"/>
+          <p:cNvPicPr/>
+          <p:nvPr/>
+        </p:nvPicPr>
+        <p:blipFill>
+          <a:blip r:embed="rId2"/>
+          <a:stretch>
+            <a:fillRect/>
+          </a:stretch>
+        </p:blipFill>
+        <p:spPr>
+          <a:xfrm>
+            <a:off x="6716045" y="1825625"/>
+            <a:ext cx="4793203" cy="4351338"/>
+          </a:xfrm>
+          <a:prstGeom prst="rect">
+            <a:avLst/>
+          </a:prstGeom>
+        </p:spPr>
+      </p:pic>
     </p:spTree>
     <p:extLst>
       <p:ext uri="{BB962C8B-B14F-4D97-AF65-F5344CB8AC3E}">
-        <p14:creationId xmlns:p14="http://schemas.microsoft.com/office/powerpoint/2010/main" val="4239403711"/>
+        <p14:creationId xmlns:p14="http://schemas.microsoft.com/office/powerpoint/2010/main" val="449919095"/>
       </p:ext>
     </p:extLst>
   </p:cSld>
@@ -3774,7 +4401,7 @@
           <a:p>
             <a:r>
               <a:rPr lang="en-US" dirty="0" smtClean="0"/>
-              <a:t>Controllers</a:t>
+              <a:t>ASP. NET MVC</a:t>
             </a:r>
             <a:endParaRPr lang="en-US" dirty="0"/>
           </a:p>
@@ -3790,19 +4417,57 @@
             <p:ph idx="1"/>
           </p:nvPr>
         </p:nvSpPr>
-        <p:spPr/>
-        <p:txBody>
-          <a:bodyPr/>
-          <a:lstStyle/>
-          <a:p>
-            <a:endParaRPr lang="en-US"/>
-          </a:p>
-        </p:txBody>
-      </p:sp>
+        <p:spPr>
+          <a:xfrm>
+            <a:off x="838200" y="1825625"/>
+            <a:ext cx="4416552" cy="4351338"/>
+          </a:xfrm>
+        </p:spPr>
+        <p:txBody>
+          <a:bodyPr/>
+          <a:lstStyle/>
+          <a:p>
+            <a:endParaRPr lang="en-US" dirty="0"/>
+          </a:p>
+        </p:txBody>
+      </p:sp>
+      <p:pic>
+        <p:nvPicPr>
+          <p:cNvPr id="5" name="Picture 4" descr="http://joel.inpointform.net/wp-content/uploads/2011/05/mvc_mvp.jpg"/>
+          <p:cNvPicPr/>
+          <p:nvPr/>
+        </p:nvPicPr>
+        <p:blipFill>
+          <a:blip r:embed="rId2">
+            <a:extLst>
+              <a:ext uri="{28A0092B-C50C-407E-A947-70E740481C1C}">
+                <a14:useLocalDpi xmlns:a14="http://schemas.microsoft.com/office/drawing/2010/main" val="0"/>
+              </a:ext>
+            </a:extLst>
+          </a:blip>
+          <a:srcRect/>
+          <a:stretch>
+            <a:fillRect/>
+          </a:stretch>
+        </p:blipFill>
+        <p:spPr bwMode="auto">
+          <a:xfrm>
+            <a:off x="5510784" y="1837816"/>
+            <a:ext cx="6212205" cy="3855847"/>
+          </a:xfrm>
+          <a:prstGeom prst="rect">
+            <a:avLst/>
+          </a:prstGeom>
+          <a:noFill/>
+          <a:ln>
+            <a:noFill/>
+          </a:ln>
+        </p:spPr>
+      </p:pic>
     </p:spTree>
     <p:extLst>
       <p:ext uri="{BB962C8B-B14F-4D97-AF65-F5344CB8AC3E}">
-        <p14:creationId xmlns:p14="http://schemas.microsoft.com/office/powerpoint/2010/main" val="1776396367"/>
+        <p14:creationId xmlns:p14="http://schemas.microsoft.com/office/powerpoint/2010/main" val="4239403711"/>
       </p:ext>
     </p:extLst>
   </p:cSld>
@@ -3846,7 +4511,7 @@
           <a:p>
             <a:r>
               <a:rPr lang="en-US" dirty="0" smtClean="0"/>
-              <a:t>Views</a:t>
+              <a:t>ASP.NET Web Forms vs ASP.NET MVC</a:t>
             </a:r>
             <a:endParaRPr lang="en-US" dirty="0"/>
           </a:p>
@@ -3862,19 +4527,57 @@
             <p:ph idx="1"/>
           </p:nvPr>
         </p:nvSpPr>
-        <p:spPr/>
-        <p:txBody>
-          <a:bodyPr/>
-          <a:lstStyle/>
-          <a:p>
-            <a:endParaRPr lang="en-US"/>
-          </a:p>
-        </p:txBody>
-      </p:sp>
+        <p:spPr>
+          <a:xfrm>
+            <a:off x="838200" y="1825625"/>
+            <a:ext cx="4879848" cy="4351338"/>
+          </a:xfrm>
+        </p:spPr>
+        <p:txBody>
+          <a:bodyPr/>
+          <a:lstStyle/>
+          <a:p>
+            <a:endParaRPr lang="en-US" dirty="0"/>
+          </a:p>
+        </p:txBody>
+      </p:sp>
+      <p:pic>
+        <p:nvPicPr>
+          <p:cNvPr id="4" name="Picture 3" descr="Figure 1"/>
+          <p:cNvPicPr/>
+          <p:nvPr/>
+        </p:nvPicPr>
+        <p:blipFill>
+          <a:blip r:embed="rId2">
+            <a:extLst>
+              <a:ext uri="{28A0092B-C50C-407E-A947-70E740481C1C}">
+                <a14:useLocalDpi xmlns:a14="http://schemas.microsoft.com/office/drawing/2010/main" val="0"/>
+              </a:ext>
+            </a:extLst>
+          </a:blip>
+          <a:srcRect/>
+          <a:stretch>
+            <a:fillRect/>
+          </a:stretch>
+        </p:blipFill>
+        <p:spPr bwMode="auto">
+          <a:xfrm>
+            <a:off x="6315456" y="1825625"/>
+            <a:ext cx="5330952" cy="4222432"/>
+          </a:xfrm>
+          <a:prstGeom prst="rect">
+            <a:avLst/>
+          </a:prstGeom>
+          <a:noFill/>
+          <a:ln>
+            <a:noFill/>
+          </a:ln>
+        </p:spPr>
+      </p:pic>
     </p:spTree>
     <p:extLst>
       <p:ext uri="{BB962C8B-B14F-4D97-AF65-F5344CB8AC3E}">
-        <p14:creationId xmlns:p14="http://schemas.microsoft.com/office/powerpoint/2010/main" val="507056793"/>
+        <p14:creationId xmlns:p14="http://schemas.microsoft.com/office/powerpoint/2010/main" val="626201613"/>
       </p:ext>
     </p:extLst>
   </p:cSld>
@@ -3918,7 +4621,7 @@
           <a:p>
             <a:r>
               <a:rPr lang="en-US" dirty="0" smtClean="0"/>
-              <a:t>Models</a:t>
+              <a:t>Views</a:t>
             </a:r>
             <a:endParaRPr lang="en-US" dirty="0"/>
           </a:p>
@@ -3946,7 +4649,7 @@
     </p:spTree>
     <p:extLst>
       <p:ext uri="{BB962C8B-B14F-4D97-AF65-F5344CB8AC3E}">
-        <p14:creationId xmlns:p14="http://schemas.microsoft.com/office/powerpoint/2010/main" val="2005459318"/>
+        <p14:creationId xmlns:p14="http://schemas.microsoft.com/office/powerpoint/2010/main" val="507056793"/>
       </p:ext>
     </p:extLst>
   </p:cSld>
@@ -3990,7 +4693,7 @@
           <a:p>
             <a:r>
               <a:rPr lang="en-US" dirty="0" smtClean="0"/>
-              <a:t>Filters</a:t>
+              <a:t>Controllers</a:t>
             </a:r>
             <a:endParaRPr lang="en-US" dirty="0"/>
           </a:p>
@@ -4018,7 +4721,7 @@
     </p:spTree>
     <p:extLst>
       <p:ext uri="{BB962C8B-B14F-4D97-AF65-F5344CB8AC3E}">
-        <p14:creationId xmlns:p14="http://schemas.microsoft.com/office/powerpoint/2010/main" val="4086552586"/>
+        <p14:creationId xmlns:p14="http://schemas.microsoft.com/office/powerpoint/2010/main" val="1776396367"/>
       </p:ext>
     </p:extLst>
   </p:cSld>
@@ -4061,16 +4764,8 @@
           <a:lstStyle/>
           <a:p>
             <a:r>
-              <a:rPr lang="en-US" dirty="0" err="1" smtClean="0"/>
-              <a:t>Autorização</a:t>
-            </a:r>
-            <a:r>
               <a:rPr lang="en-US" dirty="0" smtClean="0"/>
-              <a:t> e </a:t>
-            </a:r>
-            <a:r>
-              <a:rPr lang="en-US" dirty="0" err="1" smtClean="0"/>
-              <a:t>autenticação</a:t>
+              <a:t>Models</a:t>
             </a:r>
             <a:endParaRPr lang="en-US" dirty="0"/>
           </a:p>
@@ -4091,18 +4786,14 @@
           <a:bodyPr/>
           <a:lstStyle/>
           <a:p>
-            <a:r>
-              <a:rPr lang="en-US" dirty="0" smtClean="0"/>
-              <a:t>ASP.NET Identity</a:t>
-            </a:r>
-            <a:endParaRPr lang="en-US" dirty="0"/>
+            <a:endParaRPr lang="en-US"/>
           </a:p>
         </p:txBody>
       </p:sp>
     </p:spTree>
     <p:extLst>
       <p:ext uri="{BB962C8B-B14F-4D97-AF65-F5344CB8AC3E}">
-        <p14:creationId xmlns:p14="http://schemas.microsoft.com/office/powerpoint/2010/main" val="3226619820"/>
+        <p14:creationId xmlns:p14="http://schemas.microsoft.com/office/powerpoint/2010/main" val="2005459318"/>
       </p:ext>
     </p:extLst>
   </p:cSld>

</xml_diff>

<commit_message>
[UPDATE]: Adicionado os tópicos relacionados ao futuro do asp.net
</commit_message>
<xml_diff>
--- a/Presentation/AspNetMvc.pptx
+++ b/Presentation/AspNetMvc.pptx
@@ -1552,705 +1552,6 @@
       <dsp:cNvGrpSpPr/>
     </dsp:nvGrpSpPr>
     <dsp:grpSpPr/>
-    <dsp:sp modelId="{C86777CB-B33D-4C8A-9511-C3D973658E12}">
-      <dsp:nvSpPr>
-        <dsp:cNvPr id="0" name=""/>
-        <dsp:cNvSpPr/>
-      </dsp:nvSpPr>
-      <dsp:spPr>
-        <a:xfrm>
-          <a:off x="-17" y="0"/>
-          <a:ext cx="7858794" cy="4502183"/>
-        </a:xfrm>
-        <a:prstGeom prst="swooshArrow">
-          <a:avLst>
-            <a:gd name="adj1" fmla="val 25000"/>
-            <a:gd name="adj2" fmla="val 25000"/>
-          </a:avLst>
-        </a:prstGeom>
-        <a:solidFill>
-          <a:schemeClr val="bg2">
-            <a:lumMod val="40000"/>
-            <a:lumOff val="60000"/>
-          </a:schemeClr>
-        </a:solidFill>
-        <a:ln>
-          <a:noFill/>
-        </a:ln>
-        <a:effectLst/>
-      </dsp:spPr>
-      <dsp:style>
-        <a:lnRef idx="0">
-          <a:scrgbClr r="0" g="0" b="0"/>
-        </a:lnRef>
-        <a:fillRef idx="1">
-          <a:scrgbClr r="0" g="0" b="0"/>
-        </a:fillRef>
-        <a:effectRef idx="1">
-          <a:scrgbClr r="0" g="0" b="0"/>
-        </a:effectRef>
-        <a:fontRef idx="minor"/>
-      </dsp:style>
-    </dsp:sp>
-    <dsp:sp modelId="{368BC525-FAD0-44BA-A568-518BDEDA1A3A}">
-      <dsp:nvSpPr>
-        <dsp:cNvPr id="0" name=""/>
-        <dsp:cNvSpPr/>
-      </dsp:nvSpPr>
-      <dsp:spPr>
-        <a:xfrm>
-          <a:off x="866594" y="3306951"/>
-          <a:ext cx="165680" cy="165680"/>
-        </a:xfrm>
-        <a:prstGeom prst="ellipse">
-          <a:avLst/>
-        </a:prstGeom>
-        <a:gradFill flip="none" rotWithShape="0">
-          <a:gsLst>
-            <a:gs pos="0">
-              <a:schemeClr val="accent5">
-                <a:lumMod val="0"/>
-                <a:lumOff val="100000"/>
-              </a:schemeClr>
-            </a:gs>
-            <a:gs pos="35000">
-              <a:schemeClr val="accent5">
-                <a:lumMod val="0"/>
-                <a:lumOff val="100000"/>
-              </a:schemeClr>
-            </a:gs>
-            <a:gs pos="100000">
-              <a:schemeClr val="accent5">
-                <a:lumMod val="100000"/>
-              </a:schemeClr>
-            </a:gs>
-          </a:gsLst>
-          <a:path path="circle">
-            <a:fillToRect l="50000" t="-80000" r="50000" b="180000"/>
-          </a:path>
-          <a:tileRect/>
-        </a:gradFill>
-        <a:ln>
-          <a:noFill/>
-        </a:ln>
-        <a:effectLst/>
-        <a:scene3d>
-          <a:camera prst="orthographicFront"/>
-          <a:lightRig rig="flat" dir="t"/>
-        </a:scene3d>
-        <a:sp3d prstMaterial="dkEdge">
-          <a:bevelT w="8200" h="38100"/>
-        </a:sp3d>
-      </dsp:spPr>
-      <dsp:style>
-        <a:lnRef idx="0">
-          <a:scrgbClr r="0" g="0" b="0"/>
-        </a:lnRef>
-        <a:fillRef idx="2">
-          <a:scrgbClr r="0" g="0" b="0"/>
-        </a:fillRef>
-        <a:effectRef idx="1">
-          <a:scrgbClr r="0" g="0" b="0"/>
-        </a:effectRef>
-        <a:fontRef idx="minor">
-          <a:schemeClr val="dk1"/>
-        </a:fontRef>
-      </dsp:style>
-    </dsp:sp>
-    <dsp:sp modelId="{7CB05DE3-CF21-4A41-A117-C2056143086F}">
-      <dsp:nvSpPr>
-        <dsp:cNvPr id="0" name=""/>
-        <dsp:cNvSpPr/>
-      </dsp:nvSpPr>
-      <dsp:spPr>
-        <a:xfrm>
-          <a:off x="941293" y="3531054"/>
-          <a:ext cx="1089367" cy="721325"/>
-        </a:xfrm>
-        <a:prstGeom prst="rect">
-          <a:avLst/>
-        </a:prstGeom>
-        <a:noFill/>
-        <a:ln>
-          <a:noFill/>
-        </a:ln>
-        <a:effectLst/>
-      </dsp:spPr>
-      <dsp:style>
-        <a:lnRef idx="0">
-          <a:scrgbClr r="0" g="0" b="0"/>
-        </a:lnRef>
-        <a:fillRef idx="0">
-          <a:scrgbClr r="0" g="0" b="0"/>
-        </a:fillRef>
-        <a:effectRef idx="0">
-          <a:scrgbClr r="0" g="0" b="0"/>
-        </a:effectRef>
-        <a:fontRef idx="minor"/>
-      </dsp:style>
-      <dsp:txBody>
-        <a:bodyPr spcFirstLastPara="0" vert="horz" wrap="square" lIns="87791" tIns="0" rIns="0" bIns="0" numCol="1" spcCol="1270" anchor="t" anchorCtr="0">
-          <a:noAutofit/>
-        </a:bodyPr>
-        <a:lstStyle/>
-        <a:p>
-          <a:pPr lvl="0" algn="l" defTabSz="577850">
-            <a:lnSpc>
-              <a:spcPct val="90000"/>
-            </a:lnSpc>
-            <a:spcBef>
-              <a:spcPct val="0"/>
-            </a:spcBef>
-            <a:spcAft>
-              <a:spcPct val="35000"/>
-            </a:spcAft>
-          </a:pPr>
-          <a:r>
-            <a:rPr lang="en-US" sz="1300" kern="1200" dirty="0" smtClean="0"/>
-            <a:t>ASP.NET 1.1</a:t>
-          </a:r>
-          <a:br>
-            <a:rPr lang="en-US" sz="1300" kern="1200" dirty="0" smtClean="0"/>
-          </a:br>
-          <a:r>
-            <a:rPr lang="en-US" sz="1300" kern="1200" dirty="0" smtClean="0"/>
-            <a:t>N/A</a:t>
-          </a:r>
-          <a:endParaRPr lang="en-US" sz="1300" kern="1200" dirty="0"/>
-        </a:p>
-      </dsp:txBody>
-      <dsp:txXfrm>
-        <a:off x="941293" y="3531054"/>
-        <a:ext cx="1089367" cy="721325"/>
-      </dsp:txXfrm>
-    </dsp:sp>
-    <dsp:sp modelId="{C20D409C-3E0E-401F-A17D-161E2051613C}">
-      <dsp:nvSpPr>
-        <dsp:cNvPr id="0" name=""/>
-        <dsp:cNvSpPr/>
-      </dsp:nvSpPr>
-      <dsp:spPr>
-        <a:xfrm>
-          <a:off x="1934012" y="2486105"/>
-          <a:ext cx="259325" cy="259325"/>
-        </a:xfrm>
-        <a:prstGeom prst="ellipse">
-          <a:avLst/>
-        </a:prstGeom>
-        <a:gradFill flip="none" rotWithShape="0">
-          <a:gsLst>
-            <a:gs pos="0">
-              <a:schemeClr val="accent5">
-                <a:lumMod val="0"/>
-                <a:lumOff val="100000"/>
-              </a:schemeClr>
-            </a:gs>
-            <a:gs pos="35000">
-              <a:schemeClr val="accent5">
-                <a:lumMod val="0"/>
-                <a:lumOff val="100000"/>
-              </a:schemeClr>
-            </a:gs>
-            <a:gs pos="100000">
-              <a:schemeClr val="accent5">
-                <a:lumMod val="100000"/>
-              </a:schemeClr>
-            </a:gs>
-          </a:gsLst>
-          <a:path path="circle">
-            <a:fillToRect l="50000" t="-80000" r="50000" b="180000"/>
-          </a:path>
-          <a:tileRect/>
-        </a:gradFill>
-        <a:ln>
-          <a:noFill/>
-        </a:ln>
-        <a:effectLst/>
-        <a:scene3d>
-          <a:camera prst="orthographicFront"/>
-          <a:lightRig rig="flat" dir="t"/>
-        </a:scene3d>
-        <a:sp3d prstMaterial="dkEdge">
-          <a:bevelT w="8200" h="38100"/>
-        </a:sp3d>
-      </dsp:spPr>
-      <dsp:style>
-        <a:lnRef idx="0">
-          <a:scrgbClr r="0" g="0" b="0"/>
-        </a:lnRef>
-        <a:fillRef idx="2">
-          <a:scrgbClr r="0" g="0" b="0"/>
-        </a:fillRef>
-        <a:effectRef idx="1">
-          <a:scrgbClr r="0" g="0" b="0"/>
-        </a:effectRef>
-        <a:fontRef idx="minor">
-          <a:schemeClr val="dk1"/>
-        </a:fontRef>
-      </dsp:style>
-    </dsp:sp>
-    <dsp:sp modelId="{2FAA0972-8FDA-45DF-AEB1-EB1B640F1122}">
-      <dsp:nvSpPr>
-        <dsp:cNvPr id="0" name=""/>
-        <dsp:cNvSpPr/>
-      </dsp:nvSpPr>
-      <dsp:spPr>
-        <a:xfrm>
-          <a:off x="1015454" y="1644642"/>
-          <a:ext cx="1195779" cy="840586"/>
-        </a:xfrm>
-        <a:prstGeom prst="rect">
-          <a:avLst/>
-        </a:prstGeom>
-        <a:noFill/>
-        <a:ln>
-          <a:noFill/>
-        </a:ln>
-        <a:effectLst/>
-      </dsp:spPr>
-      <dsp:style>
-        <a:lnRef idx="0">
-          <a:scrgbClr r="0" g="0" b="0"/>
-        </a:lnRef>
-        <a:fillRef idx="0">
-          <a:scrgbClr r="0" g="0" b="0"/>
-        </a:fillRef>
-        <a:effectRef idx="0">
-          <a:scrgbClr r="0" g="0" b="0"/>
-        </a:effectRef>
-        <a:fontRef idx="minor"/>
-      </dsp:style>
-      <dsp:txBody>
-        <a:bodyPr spcFirstLastPara="0" vert="horz" wrap="square" lIns="137411" tIns="0" rIns="0" bIns="0" numCol="1" spcCol="1270" anchor="t" anchorCtr="0">
-          <a:noAutofit/>
-        </a:bodyPr>
-        <a:lstStyle/>
-        <a:p>
-          <a:pPr lvl="0" algn="l" defTabSz="577850">
-            <a:lnSpc>
-              <a:spcPct val="90000"/>
-            </a:lnSpc>
-            <a:spcBef>
-              <a:spcPct val="0"/>
-            </a:spcBef>
-            <a:spcAft>
-              <a:spcPct val="35000"/>
-            </a:spcAft>
-          </a:pPr>
-          <a:r>
-            <a:rPr lang="en-US" sz="1300" kern="1200" dirty="0" smtClean="0"/>
-            <a:t>ASP.NET 2.0</a:t>
-          </a:r>
-          <a:br>
-            <a:rPr lang="en-US" sz="1300" kern="1200" dirty="0" smtClean="0"/>
-          </a:br>
-          <a:r>
-            <a:rPr lang="en-US" sz="1300" kern="1200" dirty="0" smtClean="0"/>
-            <a:t>Membership Provider</a:t>
-          </a:r>
-          <a:endParaRPr lang="en-US" sz="1300" kern="1200" dirty="0"/>
-        </a:p>
-      </dsp:txBody>
-      <dsp:txXfrm>
-        <a:off x="1015454" y="1644642"/>
-        <a:ext cx="1195779" cy="840586"/>
-      </dsp:txXfrm>
-    </dsp:sp>
-    <dsp:sp modelId="{6FBDA9B7-E5D0-4D62-BCF4-19D60FA04F50}">
-      <dsp:nvSpPr>
-        <dsp:cNvPr id="0" name=""/>
-        <dsp:cNvSpPr/>
-      </dsp:nvSpPr>
-      <dsp:spPr>
-        <a:xfrm>
-          <a:off x="3086571" y="1799072"/>
-          <a:ext cx="345767" cy="345767"/>
-        </a:xfrm>
-        <a:prstGeom prst="ellipse">
-          <a:avLst/>
-        </a:prstGeom>
-        <a:gradFill flip="none" rotWithShape="0">
-          <a:gsLst>
-            <a:gs pos="0">
-              <a:schemeClr val="accent5">
-                <a:lumMod val="0"/>
-                <a:lumOff val="100000"/>
-              </a:schemeClr>
-            </a:gs>
-            <a:gs pos="35000">
-              <a:schemeClr val="accent5">
-                <a:lumMod val="0"/>
-                <a:lumOff val="100000"/>
-              </a:schemeClr>
-            </a:gs>
-            <a:gs pos="100000">
-              <a:schemeClr val="accent5">
-                <a:lumMod val="100000"/>
-              </a:schemeClr>
-            </a:gs>
-          </a:gsLst>
-          <a:path path="circle">
-            <a:fillToRect l="50000" t="-80000" r="50000" b="180000"/>
-          </a:path>
-          <a:tileRect/>
-        </a:gradFill>
-        <a:ln>
-          <a:noFill/>
-        </a:ln>
-        <a:effectLst/>
-        <a:scene3d>
-          <a:camera prst="orthographicFront"/>
-          <a:lightRig rig="flat" dir="t"/>
-        </a:scene3d>
-        <a:sp3d prstMaterial="dkEdge">
-          <a:bevelT w="8200" h="38100"/>
-        </a:sp3d>
-      </dsp:spPr>
-      <dsp:style>
-        <a:lnRef idx="0">
-          <a:scrgbClr r="0" g="0" b="0"/>
-        </a:lnRef>
-        <a:fillRef idx="2">
-          <a:scrgbClr r="0" g="0" b="0"/>
-        </a:fillRef>
-        <a:effectRef idx="1">
-          <a:scrgbClr r="0" g="0" b="0"/>
-        </a:effectRef>
-        <a:fontRef idx="minor">
-          <a:schemeClr val="dk1"/>
-        </a:fontRef>
-      </dsp:style>
-    </dsp:sp>
-    <dsp:sp modelId="{CC6365D6-BC5A-4662-88C2-460380F95395}">
-      <dsp:nvSpPr>
-        <dsp:cNvPr id="0" name=""/>
-        <dsp:cNvSpPr/>
-      </dsp:nvSpPr>
-      <dsp:spPr>
-        <a:xfrm>
-          <a:off x="3107651" y="2410520"/>
-          <a:ext cx="1390274" cy="906074"/>
-        </a:xfrm>
-        <a:prstGeom prst="rect">
-          <a:avLst/>
-        </a:prstGeom>
-        <a:noFill/>
-        <a:ln>
-          <a:noFill/>
-        </a:ln>
-        <a:effectLst/>
-      </dsp:spPr>
-      <dsp:style>
-        <a:lnRef idx="0">
-          <a:scrgbClr r="0" g="0" b="0"/>
-        </a:lnRef>
-        <a:fillRef idx="0">
-          <a:scrgbClr r="0" g="0" b="0"/>
-        </a:fillRef>
-        <a:effectRef idx="0">
-          <a:scrgbClr r="0" g="0" b="0"/>
-        </a:effectRef>
-        <a:fontRef idx="minor"/>
-      </dsp:style>
-      <dsp:txBody>
-        <a:bodyPr spcFirstLastPara="0" vert="horz" wrap="square" lIns="183215" tIns="0" rIns="0" bIns="0" numCol="1" spcCol="1270" anchor="t" anchorCtr="0">
-          <a:noAutofit/>
-        </a:bodyPr>
-        <a:lstStyle/>
-        <a:p>
-          <a:pPr lvl="0" algn="l" defTabSz="577850">
-            <a:lnSpc>
-              <a:spcPct val="90000"/>
-            </a:lnSpc>
-            <a:spcBef>
-              <a:spcPct val="0"/>
-            </a:spcBef>
-            <a:spcAft>
-              <a:spcPct val="35000"/>
-            </a:spcAft>
-          </a:pPr>
-          <a:r>
-            <a:rPr lang="en-US" sz="1300" kern="1200" dirty="0" smtClean="0"/>
-            <a:t>ASP.NET 4</a:t>
-          </a:r>
-          <a:br>
-            <a:rPr lang="en-US" sz="1300" kern="1200" dirty="0" smtClean="0"/>
-          </a:br>
-          <a:r>
-            <a:rPr lang="en-US" sz="1300" kern="1200" dirty="0" smtClean="0"/>
-            <a:t>Simple Membership</a:t>
-          </a:r>
-        </a:p>
-      </dsp:txBody>
-      <dsp:txXfrm>
-        <a:off x="3107651" y="2410520"/>
-        <a:ext cx="1390274" cy="906074"/>
-      </dsp:txXfrm>
-    </dsp:sp>
-    <dsp:sp modelId="{238B15F4-CFF9-43D7-862E-CABB501E2892}">
-      <dsp:nvSpPr>
-        <dsp:cNvPr id="0" name=""/>
-        <dsp:cNvSpPr/>
-      </dsp:nvSpPr>
-      <dsp:spPr>
-        <a:xfrm>
-          <a:off x="4426421" y="1262412"/>
-          <a:ext cx="446616" cy="446616"/>
-        </a:xfrm>
-        <a:prstGeom prst="ellipse">
-          <a:avLst/>
-        </a:prstGeom>
-        <a:gradFill flip="none" rotWithShape="0">
-          <a:gsLst>
-            <a:gs pos="0">
-              <a:schemeClr val="accent5">
-                <a:lumMod val="0"/>
-                <a:lumOff val="100000"/>
-              </a:schemeClr>
-            </a:gs>
-            <a:gs pos="35000">
-              <a:schemeClr val="accent5">
-                <a:lumMod val="0"/>
-                <a:lumOff val="100000"/>
-              </a:schemeClr>
-            </a:gs>
-            <a:gs pos="100000">
-              <a:schemeClr val="accent5">
-                <a:lumMod val="100000"/>
-              </a:schemeClr>
-            </a:gs>
-          </a:gsLst>
-          <a:path path="circle">
-            <a:fillToRect l="50000" t="-80000" r="50000" b="180000"/>
-          </a:path>
-          <a:tileRect/>
-        </a:gradFill>
-        <a:ln>
-          <a:noFill/>
-        </a:ln>
-        <a:effectLst/>
-        <a:scene3d>
-          <a:camera prst="orthographicFront"/>
-          <a:lightRig rig="flat" dir="t"/>
-        </a:scene3d>
-        <a:sp3d prstMaterial="dkEdge">
-          <a:bevelT w="8200" h="38100"/>
-        </a:sp3d>
-      </dsp:spPr>
-      <dsp:style>
-        <a:lnRef idx="0">
-          <a:scrgbClr r="0" g="0" b="0"/>
-        </a:lnRef>
-        <a:fillRef idx="2">
-          <a:scrgbClr r="0" g="0" b="0"/>
-        </a:fillRef>
-        <a:effectRef idx="1">
-          <a:scrgbClr r="0" g="0" b="0"/>
-        </a:effectRef>
-        <a:fontRef idx="minor">
-          <a:schemeClr val="dk1"/>
-        </a:fontRef>
-      </dsp:style>
-    </dsp:sp>
-    <dsp:sp modelId="{48381EF1-0387-4E13-A84D-28EB559E8678}">
-      <dsp:nvSpPr>
-        <dsp:cNvPr id="0" name=""/>
-        <dsp:cNvSpPr/>
-      </dsp:nvSpPr>
-      <dsp:spPr>
-        <a:xfrm>
-          <a:off x="3331763" y="468282"/>
-          <a:ext cx="1834844" cy="593609"/>
-        </a:xfrm>
-        <a:prstGeom prst="rect">
-          <a:avLst/>
-        </a:prstGeom>
-        <a:noFill/>
-        <a:ln>
-          <a:noFill/>
-        </a:ln>
-        <a:effectLst/>
-      </dsp:spPr>
-      <dsp:style>
-        <a:lnRef idx="0">
-          <a:scrgbClr r="0" g="0" b="0"/>
-        </a:lnRef>
-        <a:fillRef idx="0">
-          <a:scrgbClr r="0" g="0" b="0"/>
-        </a:fillRef>
-        <a:effectRef idx="0">
-          <a:scrgbClr r="0" g="0" b="0"/>
-        </a:effectRef>
-        <a:fontRef idx="minor"/>
-      </dsp:style>
-      <dsp:txBody>
-        <a:bodyPr spcFirstLastPara="0" vert="horz" wrap="square" lIns="236653" tIns="0" rIns="0" bIns="0" numCol="1" spcCol="1270" anchor="t" anchorCtr="0">
-          <a:noAutofit/>
-        </a:bodyPr>
-        <a:lstStyle/>
-        <a:p>
-          <a:pPr lvl="0" algn="l" defTabSz="577850">
-            <a:lnSpc>
-              <a:spcPct val="90000"/>
-            </a:lnSpc>
-            <a:spcBef>
-              <a:spcPct val="0"/>
-            </a:spcBef>
-            <a:spcAft>
-              <a:spcPct val="35000"/>
-            </a:spcAft>
-          </a:pPr>
-          <a:r>
-            <a:rPr lang="en-US" sz="1300" kern="1200" dirty="0" smtClean="0"/>
-            <a:t>ASP.NET 4/4.5</a:t>
-          </a:r>
-          <a:br>
-            <a:rPr lang="en-US" sz="1300" kern="1200" dirty="0" smtClean="0"/>
-          </a:br>
-          <a:r>
-            <a:rPr lang="en-US" sz="1300" kern="1200" dirty="0" smtClean="0"/>
-            <a:t>Universal Providers</a:t>
-          </a:r>
-          <a:endParaRPr lang="en-US" sz="1300" kern="1200" dirty="0"/>
-        </a:p>
-      </dsp:txBody>
-      <dsp:txXfrm>
-        <a:off x="3331763" y="468282"/>
-        <a:ext cx="1834844" cy="593609"/>
-      </dsp:txXfrm>
-    </dsp:sp>
-    <dsp:sp modelId="{4E2663D7-ACE9-4775-AA3F-17DDBE267A56}">
-      <dsp:nvSpPr>
-        <dsp:cNvPr id="0" name=""/>
-        <dsp:cNvSpPr/>
-      </dsp:nvSpPr>
-      <dsp:spPr>
-        <a:xfrm>
-          <a:off x="5805889" y="904038"/>
-          <a:ext cx="569075" cy="569075"/>
-        </a:xfrm>
-        <a:prstGeom prst="ellipse">
-          <a:avLst/>
-        </a:prstGeom>
-        <a:gradFill flip="none" rotWithShape="0">
-          <a:gsLst>
-            <a:gs pos="0">
-              <a:schemeClr val="accent5">
-                <a:lumMod val="0"/>
-                <a:lumOff val="100000"/>
-              </a:schemeClr>
-            </a:gs>
-            <a:gs pos="35000">
-              <a:schemeClr val="accent5">
-                <a:lumMod val="0"/>
-                <a:lumOff val="100000"/>
-              </a:schemeClr>
-            </a:gs>
-            <a:gs pos="100000">
-              <a:schemeClr val="accent5">
-                <a:lumMod val="100000"/>
-              </a:schemeClr>
-            </a:gs>
-          </a:gsLst>
-          <a:path path="circle">
-            <a:fillToRect l="50000" t="-80000" r="50000" b="180000"/>
-          </a:path>
-          <a:tileRect/>
-        </a:gradFill>
-        <a:ln>
-          <a:noFill/>
-        </a:ln>
-        <a:effectLst/>
-        <a:scene3d>
-          <a:camera prst="orthographicFront"/>
-          <a:lightRig rig="flat" dir="t"/>
-        </a:scene3d>
-        <a:sp3d prstMaterial="dkEdge">
-          <a:bevelT w="8200" h="38100"/>
-        </a:sp3d>
-      </dsp:spPr>
-      <dsp:style>
-        <a:lnRef idx="0">
-          <a:scrgbClr r="0" g="0" b="0"/>
-        </a:lnRef>
-        <a:fillRef idx="2">
-          <a:scrgbClr r="0" g="0" b="0"/>
-        </a:fillRef>
-        <a:effectRef idx="1">
-          <a:scrgbClr r="0" g="0" b="0"/>
-        </a:effectRef>
-        <a:fontRef idx="minor">
-          <a:schemeClr val="dk1"/>
-        </a:fontRef>
-      </dsp:style>
-    </dsp:sp>
-    <dsp:sp modelId="{8F385B18-7ECC-490B-B267-043A6C368803}">
-      <dsp:nvSpPr>
-        <dsp:cNvPr id="0" name=""/>
-        <dsp:cNvSpPr/>
-      </dsp:nvSpPr>
-      <dsp:spPr>
-        <a:xfrm>
-          <a:off x="5423420" y="1839683"/>
-          <a:ext cx="1856815" cy="869656"/>
-        </a:xfrm>
-        <a:prstGeom prst="rect">
-          <a:avLst/>
-        </a:prstGeom>
-        <a:noFill/>
-        <a:ln>
-          <a:noFill/>
-        </a:ln>
-        <a:effectLst/>
-      </dsp:spPr>
-      <dsp:style>
-        <a:lnRef idx="0">
-          <a:scrgbClr r="0" g="0" b="0"/>
-        </a:lnRef>
-        <a:fillRef idx="0">
-          <a:scrgbClr r="0" g="0" b="0"/>
-        </a:fillRef>
-        <a:effectRef idx="0">
-          <a:scrgbClr r="0" g="0" b="0"/>
-        </a:effectRef>
-        <a:fontRef idx="minor"/>
-      </dsp:style>
-      <dsp:txBody>
-        <a:bodyPr spcFirstLastPara="0" vert="horz" wrap="square" lIns="301542" tIns="0" rIns="0" bIns="0" numCol="1" spcCol="1270" anchor="t" anchorCtr="0">
-          <a:noAutofit/>
-        </a:bodyPr>
-        <a:lstStyle/>
-        <a:p>
-          <a:pPr lvl="0" algn="l" defTabSz="577850">
-            <a:lnSpc>
-              <a:spcPct val="90000"/>
-            </a:lnSpc>
-            <a:spcBef>
-              <a:spcPct val="0"/>
-            </a:spcBef>
-            <a:spcAft>
-              <a:spcPct val="35000"/>
-            </a:spcAft>
-          </a:pPr>
-          <a:r>
-            <a:rPr lang="en-US" sz="1300" kern="1200" dirty="0" smtClean="0"/>
-            <a:t>ASP.NET 4.5</a:t>
-          </a:r>
-          <a:br>
-            <a:rPr lang="en-US" sz="1300" kern="1200" dirty="0" smtClean="0"/>
-          </a:br>
-          <a:r>
-            <a:rPr lang="en-US" sz="1300" kern="1200" dirty="0" smtClean="0"/>
-            <a:t>One ASP.NET Identity</a:t>
-          </a:r>
-          <a:endParaRPr lang="en-US" sz="1300" kern="1200" dirty="0"/>
-        </a:p>
-      </dsp:txBody>
-      <dsp:txXfrm>
-        <a:off x="5423420" y="1839683"/>
-        <a:ext cx="1856815" cy="869656"/>
-      </dsp:txXfrm>
-    </dsp:sp>
   </dsp:spTree>
 </dsp:drawing>
 </file>
@@ -10977,6 +10278,14 @@
           <a:bodyPr/>
           <a:lstStyle/>
           <a:p>
+            <a:r>
+              <a:rPr lang="en-US" dirty="0" smtClean="0"/>
+              <a:t>Eduardo </a:t>
+            </a:r>
+            <a:r>
+              <a:rPr lang="en-US" dirty="0" err="1" smtClean="0"/>
+              <a:t>silva</a:t>
+            </a:r>
             <a:endParaRPr lang="en-US" dirty="0"/>
           </a:p>
         </p:txBody>
@@ -18831,12 +18140,213 @@
             <p:ph idx="1"/>
           </p:nvPr>
         </p:nvSpPr>
-        <p:spPr/>
+        <p:spPr>
+          <a:xfrm>
+            <a:off x="646111" y="1553046"/>
+            <a:ext cx="8946541" cy="4969674"/>
+          </a:xfrm>
+        </p:spPr>
         <p:txBody>
-          <a:bodyPr/>
+          <a:bodyPr>
+            <a:normAutofit/>
+          </a:bodyPr>
           <a:lstStyle/>
           <a:p>
-            <a:endParaRPr lang="en-US"/>
+            <a:r>
+              <a:rPr lang="en-US" dirty="0" smtClean="0"/>
+              <a:t>ASP.NET 5 </a:t>
+            </a:r>
+            <a:r>
+              <a:rPr lang="en-US" dirty="0" err="1" smtClean="0"/>
+              <a:t>será</a:t>
+            </a:r>
+            <a:r>
+              <a:rPr lang="en-US" dirty="0" smtClean="0"/>
+              <a:t> </a:t>
+            </a:r>
+            <a:r>
+              <a:rPr lang="en-US" dirty="0" err="1" smtClean="0"/>
+              <a:t>multiplataforma</a:t>
+            </a:r>
+            <a:endParaRPr lang="en-US" dirty="0" smtClean="0"/>
+          </a:p>
+          <a:p>
+            <a:r>
+              <a:rPr lang="en-US" dirty="0" smtClean="0"/>
+              <a:t>Novo </a:t>
+            </a:r>
+            <a:r>
+              <a:rPr lang="en-US" dirty="0" err="1" smtClean="0"/>
+              <a:t>compilador</a:t>
+            </a:r>
+            <a:r>
+              <a:rPr lang="en-US" dirty="0" smtClean="0"/>
+              <a:t> (Roslyn)</a:t>
+            </a:r>
+          </a:p>
+          <a:p>
+            <a:r>
+              <a:rPr lang="en-US" dirty="0" err="1" smtClean="0"/>
+              <a:t>Divisão</a:t>
+            </a:r>
+            <a:r>
+              <a:rPr lang="en-US" dirty="0" smtClean="0"/>
+              <a:t> de </a:t>
+            </a:r>
+            <a:r>
+              <a:rPr lang="en-US" dirty="0" err="1" smtClean="0"/>
+              <a:t>responsabilidade</a:t>
+            </a:r>
+            <a:r>
+              <a:rPr lang="en-US" dirty="0" smtClean="0"/>
+              <a:t> entre </a:t>
+            </a:r>
+            <a:r>
+              <a:rPr lang="en-US" dirty="0" err="1" smtClean="0"/>
+              <a:t>os</a:t>
+            </a:r>
+            <a:r>
+              <a:rPr lang="en-US" dirty="0" smtClean="0"/>
+              <a:t> </a:t>
+            </a:r>
+            <a:r>
+              <a:rPr lang="en-US" dirty="0" err="1" smtClean="0"/>
+              <a:t>gerenciadores</a:t>
+            </a:r>
+            <a:r>
+              <a:rPr lang="en-US" dirty="0" smtClean="0"/>
+              <a:t> de </a:t>
+            </a:r>
+            <a:r>
+              <a:rPr lang="en-US" dirty="0" err="1" smtClean="0"/>
+              <a:t>pacotes</a:t>
+            </a:r>
+            <a:endParaRPr lang="en-US" dirty="0" smtClean="0"/>
+          </a:p>
+          <a:p>
+            <a:pPr lvl="1"/>
+            <a:r>
+              <a:rPr lang="en-US" dirty="0" err="1" smtClean="0"/>
+              <a:t>Nuget</a:t>
+            </a:r>
+            <a:r>
+              <a:rPr lang="en-US" dirty="0" smtClean="0"/>
+              <a:t>: Server-side</a:t>
+            </a:r>
+          </a:p>
+          <a:p>
+            <a:pPr lvl="1"/>
+            <a:r>
+              <a:rPr lang="en-US" dirty="0" smtClean="0"/>
+              <a:t>Bower: Client-side</a:t>
+            </a:r>
+          </a:p>
+          <a:p>
+            <a:r>
+              <a:rPr lang="en-US" dirty="0" smtClean="0"/>
+              <a:t>System.Web.dll </a:t>
+            </a:r>
+            <a:r>
+              <a:rPr lang="en-US" dirty="0" err="1" smtClean="0"/>
+              <a:t>não</a:t>
+            </a:r>
+            <a:r>
+              <a:rPr lang="en-US" dirty="0" smtClean="0"/>
+              <a:t> </a:t>
+            </a:r>
+            <a:r>
+              <a:rPr lang="en-US" dirty="0" err="1" smtClean="0"/>
+              <a:t>estará</a:t>
+            </a:r>
+            <a:r>
+              <a:rPr lang="en-US" dirty="0" smtClean="0"/>
+              <a:t> </a:t>
+            </a:r>
+            <a:r>
+              <a:rPr lang="en-US" dirty="0" err="1" smtClean="0"/>
+              <a:t>mais</a:t>
+            </a:r>
+            <a:r>
+              <a:rPr lang="en-US" dirty="0" smtClean="0"/>
+              <a:t> </a:t>
+            </a:r>
+            <a:r>
+              <a:rPr lang="en-US" dirty="0" err="1" smtClean="0"/>
+              <a:t>disponível</a:t>
+            </a:r>
+            <a:r>
+              <a:rPr lang="en-US" dirty="0" smtClean="0"/>
+              <a:t>.</a:t>
+            </a:r>
+          </a:p>
+          <a:p>
+            <a:r>
+              <a:rPr lang="en-US" dirty="0" err="1" smtClean="0"/>
+              <a:t>Compilação</a:t>
+            </a:r>
+            <a:r>
+              <a:rPr lang="en-US" dirty="0" smtClean="0"/>
+              <a:t> </a:t>
+            </a:r>
+            <a:r>
+              <a:rPr lang="en-US" dirty="0" err="1" smtClean="0"/>
+              <a:t>dinâmica</a:t>
+            </a:r>
+            <a:endParaRPr lang="en-US" dirty="0" smtClean="0"/>
+          </a:p>
+          <a:p>
+            <a:r>
+              <a:rPr lang="en-US" dirty="0" err="1" smtClean="0"/>
+              <a:t>Arquivos</a:t>
+            </a:r>
+            <a:r>
+              <a:rPr lang="en-US" dirty="0" smtClean="0"/>
+              <a:t> de </a:t>
+            </a:r>
+            <a:r>
+              <a:rPr lang="en-US" dirty="0" err="1" smtClean="0"/>
+              <a:t>configurações</a:t>
+            </a:r>
+            <a:r>
+              <a:rPr lang="en-US" dirty="0" smtClean="0"/>
+              <a:t> </a:t>
+            </a:r>
+            <a:r>
+              <a:rPr lang="en-US" dirty="0" err="1" smtClean="0"/>
+              <a:t>serão</a:t>
+            </a:r>
+            <a:r>
+              <a:rPr lang="en-US" dirty="0" smtClean="0"/>
+              <a:t> </a:t>
+            </a:r>
+            <a:r>
+              <a:rPr lang="en-US" dirty="0" err="1" smtClean="0"/>
+              <a:t>baseados</a:t>
+            </a:r>
+            <a:r>
+              <a:rPr lang="en-US" dirty="0" smtClean="0"/>
+              <a:t> </a:t>
+            </a:r>
+            <a:r>
+              <a:rPr lang="en-US" dirty="0" err="1" smtClean="0"/>
+              <a:t>em</a:t>
+            </a:r>
+            <a:r>
+              <a:rPr lang="en-US" dirty="0" smtClean="0"/>
+              <a:t> JSON</a:t>
+            </a:r>
+          </a:p>
+          <a:p>
+            <a:r>
+              <a:rPr lang="en-US" dirty="0" smtClean="0"/>
+              <a:t>View Components</a:t>
+            </a:r>
+          </a:p>
+          <a:p>
+            <a:r>
+              <a:rPr lang="en-US" dirty="0" smtClean="0"/>
+              <a:t>Tag Helpers</a:t>
+            </a:r>
           </a:p>
         </p:txBody>
       </p:sp>

</xml_diff>

<commit_message>
[UPDATE]: Ajustado alguns tópicos
</commit_message>
<xml_diff>
--- a/Presentation/AspNetMvc.pptx
+++ b/Presentation/AspNetMvc.pptx
@@ -5089,7 +5089,7 @@
           <a:p>
             <a:fld id="{9B284AA3-C948-4AEF-9698-7E1A93E5B36F}" type="datetimeFigureOut">
               <a:rPr lang="en-US" smtClean="0"/>
-              <a:t>24-Jul-15</a:t>
+              <a:t>7/25/2015</a:t>
             </a:fld>
             <a:endParaRPr lang="en-US"/>
           </a:p>
@@ -5364,7 +5364,7 @@
           <a:p>
             <a:fld id="{9B284AA3-C948-4AEF-9698-7E1A93E5B36F}" type="datetimeFigureOut">
               <a:rPr lang="en-US" smtClean="0"/>
-              <a:t>24-Jul-15</a:t>
+              <a:t>7/25/2015</a:t>
             </a:fld>
             <a:endParaRPr lang="en-US"/>
           </a:p>
@@ -5558,7 +5558,7 @@
           <a:p>
             <a:fld id="{9B284AA3-C948-4AEF-9698-7E1A93E5B36F}" type="datetimeFigureOut">
               <a:rPr lang="en-US" smtClean="0"/>
-              <a:t>24-Jul-15</a:t>
+              <a:t>7/25/2015</a:t>
             </a:fld>
             <a:endParaRPr lang="en-US"/>
           </a:p>
@@ -5831,7 +5831,7 @@
           <a:p>
             <a:fld id="{9B284AA3-C948-4AEF-9698-7E1A93E5B36F}" type="datetimeFigureOut">
               <a:rPr lang="en-US" smtClean="0"/>
-              <a:t>24-Jul-15</a:t>
+              <a:t>7/25/2015</a:t>
             </a:fld>
             <a:endParaRPr lang="en-US"/>
           </a:p>
@@ -6172,7 +6172,7 @@
           <a:p>
             <a:fld id="{9B284AA3-C948-4AEF-9698-7E1A93E5B36F}" type="datetimeFigureOut">
               <a:rPr lang="en-US" smtClean="0"/>
-              <a:t>24-Jul-15</a:t>
+              <a:t>7/25/2015</a:t>
             </a:fld>
             <a:endParaRPr lang="en-US"/>
           </a:p>
@@ -6795,7 +6795,7 @@
           <a:p>
             <a:fld id="{9B284AA3-C948-4AEF-9698-7E1A93E5B36F}" type="datetimeFigureOut">
               <a:rPr lang="en-US" smtClean="0"/>
-              <a:t>24-Jul-15</a:t>
+              <a:t>7/25/2015</a:t>
             </a:fld>
             <a:endParaRPr lang="en-US"/>
           </a:p>
@@ -7655,7 +7655,7 @@
           <a:p>
             <a:fld id="{9B284AA3-C948-4AEF-9698-7E1A93E5B36F}" type="datetimeFigureOut">
               <a:rPr lang="en-US" smtClean="0"/>
-              <a:t>24-Jul-15</a:t>
+              <a:t>7/25/2015</a:t>
             </a:fld>
             <a:endParaRPr lang="en-US"/>
           </a:p>
@@ -7825,7 +7825,7 @@
           <a:p>
             <a:fld id="{9B284AA3-C948-4AEF-9698-7E1A93E5B36F}" type="datetimeFigureOut">
               <a:rPr lang="en-US" smtClean="0"/>
-              <a:t>24-Jul-15</a:t>
+              <a:t>7/25/2015</a:t>
             </a:fld>
             <a:endParaRPr lang="en-US"/>
           </a:p>
@@ -8005,7 +8005,7 @@
           <a:p>
             <a:fld id="{9B284AA3-C948-4AEF-9698-7E1A93E5B36F}" type="datetimeFigureOut">
               <a:rPr lang="en-US" smtClean="0"/>
-              <a:t>24-Jul-15</a:t>
+              <a:t>7/25/2015</a:t>
             </a:fld>
             <a:endParaRPr lang="en-US"/>
           </a:p>
@@ -8175,7 +8175,7 @@
           <a:p>
             <a:fld id="{9B284AA3-C948-4AEF-9698-7E1A93E5B36F}" type="datetimeFigureOut">
               <a:rPr lang="en-US" smtClean="0"/>
-              <a:t>24-Jul-15</a:t>
+              <a:t>7/25/2015</a:t>
             </a:fld>
             <a:endParaRPr lang="en-US"/>
           </a:p>
@@ -8422,7 +8422,7 @@
           <a:p>
             <a:fld id="{9B284AA3-C948-4AEF-9698-7E1A93E5B36F}" type="datetimeFigureOut">
               <a:rPr lang="en-US" smtClean="0"/>
-              <a:t>24-Jul-15</a:t>
+              <a:t>7/25/2015</a:t>
             </a:fld>
             <a:endParaRPr lang="en-US"/>
           </a:p>
@@ -8714,7 +8714,7 @@
           <a:p>
             <a:fld id="{9B284AA3-C948-4AEF-9698-7E1A93E5B36F}" type="datetimeFigureOut">
               <a:rPr lang="en-US" smtClean="0"/>
-              <a:t>24-Jul-15</a:t>
+              <a:t>7/25/2015</a:t>
             </a:fld>
             <a:endParaRPr lang="en-US"/>
           </a:p>
@@ -9158,7 +9158,7 @@
           <a:p>
             <a:fld id="{9B284AA3-C948-4AEF-9698-7E1A93E5B36F}" type="datetimeFigureOut">
               <a:rPr lang="en-US" smtClean="0"/>
-              <a:t>24-Jul-15</a:t>
+              <a:t>7/25/2015</a:t>
             </a:fld>
             <a:endParaRPr lang="en-US"/>
           </a:p>
@@ -9276,7 +9276,7 @@
           <a:p>
             <a:fld id="{9B284AA3-C948-4AEF-9698-7E1A93E5B36F}" type="datetimeFigureOut">
               <a:rPr lang="en-US" smtClean="0"/>
-              <a:t>24-Jul-15</a:t>
+              <a:t>7/25/2015</a:t>
             </a:fld>
             <a:endParaRPr lang="en-US"/>
           </a:p>
@@ -9371,7 +9371,7 @@
           <a:p>
             <a:fld id="{9B284AA3-C948-4AEF-9698-7E1A93E5B36F}" type="datetimeFigureOut">
               <a:rPr lang="en-US" smtClean="0"/>
-              <a:t>24-Jul-15</a:t>
+              <a:t>7/25/2015</a:t>
             </a:fld>
             <a:endParaRPr lang="en-US"/>
           </a:p>
@@ -9650,7 +9650,7 @@
           <a:p>
             <a:fld id="{9B284AA3-C948-4AEF-9698-7E1A93E5B36F}" type="datetimeFigureOut">
               <a:rPr lang="en-US" smtClean="0"/>
-              <a:t>24-Jul-15</a:t>
+              <a:t>7/25/2015</a:t>
             </a:fld>
             <a:endParaRPr lang="en-US"/>
           </a:p>
@@ -9925,7 +9925,7 @@
           <a:p>
             <a:fld id="{9B284AA3-C948-4AEF-9698-7E1A93E5B36F}" type="datetimeFigureOut">
               <a:rPr lang="en-US" smtClean="0"/>
-              <a:t>24-Jul-15</a:t>
+              <a:t>7/25/2015</a:t>
             </a:fld>
             <a:endParaRPr lang="en-US"/>
           </a:p>
@@ -10354,7 +10354,7 @@
           <a:p>
             <a:fld id="{9B284AA3-C948-4AEF-9698-7E1A93E5B36F}" type="datetimeFigureOut">
               <a:rPr lang="en-US" smtClean="0"/>
-              <a:t>24-Jul-15</a:t>
+              <a:t>7/25/2015</a:t>
             </a:fld>
             <a:endParaRPr lang="en-US"/>
           </a:p>
@@ -12205,11 +12205,7 @@
           <a:p>
             <a:r>
               <a:rPr lang="en-US" dirty="0" smtClean="0"/>
-              <a:t>Controllers: Get </a:t>
-            </a:r>
-            <a:r>
-              <a:rPr lang="en-US" dirty="0" smtClean="0"/>
-              <a:t>vs Post</a:t>
+              <a:t>Controllers: Get vs Post</a:t>
             </a:r>
             <a:endParaRPr lang="en-US" dirty="0"/>
           </a:p>
@@ -13008,6 +13004,12 @@
           <a:p>
             <a:r>
               <a:rPr lang="en-US" dirty="0" smtClean="0"/>
+              <a:t>GET vs POST</a:t>
+            </a:r>
+          </a:p>
+          <a:p>
+            <a:r>
+              <a:rPr lang="en-US" dirty="0" smtClean="0"/>
               <a:t>Action</a:t>
             </a:r>
             <a:endParaRPr lang="en-US" dirty="0" smtClean="0"/>
@@ -13090,13 +13092,8 @@
             <a:pPr lvl="2"/>
             <a:r>
               <a:rPr lang="en-US" dirty="0" smtClean="0"/>
-              <a:t>MVC model </a:t>
-            </a:r>
-            <a:r>
-              <a:rPr lang="en-US" dirty="0" smtClean="0"/>
-              <a:t>binding</a:t>
-            </a:r>
-            <a:endParaRPr lang="en-US" dirty="0" smtClean="0"/>
+              <a:t>MVC model binding</a:t>
+            </a:r>
           </a:p>
         </p:txBody>
       </p:sp>
@@ -13914,15 +13911,13 @@
           <a:p>
             <a:r>
               <a:rPr lang="en-US" dirty="0" smtClean="0"/>
-              <a:t>Client Server</a:t>
-            </a:r>
-          </a:p>
-          <a:p>
+              <a:t>Client </a:t>
+            </a:r>
             <a:r>
               <a:rPr lang="en-US" dirty="0" smtClean="0"/>
-              <a:t>Get vs Post</a:t>
-            </a:r>
-            <a:endParaRPr lang="en-US" dirty="0"/>
+              <a:t>Server</a:t>
+            </a:r>
+            <a:endParaRPr lang="en-US" dirty="0" smtClean="0"/>
           </a:p>
         </p:txBody>
       </p:sp>
@@ -14397,7 +14392,6 @@
               <a:rPr lang="en-US" dirty="0" smtClean="0"/>
               <a:t>URL</a:t>
             </a:r>
-            <a:endParaRPr lang="en-US" dirty="0" smtClean="0"/>
           </a:p>
           <a:p>
             <a:pPr lvl="1"/>
@@ -14412,11 +14406,7 @@
           <a:p>
             <a:r>
               <a:rPr lang="en-US" dirty="0" smtClean="0"/>
-              <a:t>O </a:t>
-            </a:r>
-            <a:r>
-              <a:rPr lang="en-US" dirty="0" smtClean="0"/>
-              <a:t>Routing do MVC </a:t>
+              <a:t>O Routing do MVC </a:t>
             </a:r>
             <a:r>
               <a:rPr lang="en-US" dirty="0" err="1" smtClean="0"/>
@@ -15640,7 +15630,6 @@
               <a:rPr lang="en-US" sz="2400" dirty="0"/>
               <a:t> com a View</a:t>
             </a:r>
-            <a:endParaRPr lang="en-US" sz="2400" dirty="0"/>
           </a:p>
         </p:txBody>
       </p:sp>
@@ -15977,7 +15966,6 @@
               <a:rPr lang="en-US" dirty="0"/>
               <a:t> Filters</a:t>
             </a:r>
-            <a:endParaRPr lang="en-US" dirty="0"/>
           </a:p>
         </p:txBody>
       </p:sp>
@@ -16161,7 +16149,6 @@
               <a:rPr lang="en-US" sz="2400" dirty="0"/>
               <a:t> com a View</a:t>
             </a:r>
-            <a:endParaRPr lang="en-US" sz="2400" dirty="0"/>
           </a:p>
         </p:txBody>
       </p:sp>
@@ -17955,7 +17942,45 @@
             </a:r>
             <a:r>
               <a:rPr lang="en-US" dirty="0" smtClean="0"/>
-              <a:t> Over posting</a:t>
+              <a:t> Over </a:t>
+            </a:r>
+            <a:r>
+              <a:rPr lang="en-US" dirty="0" smtClean="0"/>
+              <a:t>posting</a:t>
+            </a:r>
+          </a:p>
+          <a:p>
+            <a:r>
+              <a:rPr lang="en-US" dirty="0" err="1" smtClean="0"/>
+              <a:t>Utilizem</a:t>
+            </a:r>
+            <a:r>
+              <a:rPr lang="en-US" dirty="0" smtClean="0"/>
+              <a:t> Task, </a:t>
+            </a:r>
+            <a:r>
+              <a:rPr lang="en-US" dirty="0" err="1" smtClean="0"/>
+              <a:t>async</a:t>
+            </a:r>
+            <a:r>
+              <a:rPr lang="en-US" dirty="0" smtClean="0"/>
+              <a:t> e await </a:t>
+            </a:r>
+            <a:r>
+              <a:rPr lang="en-US" dirty="0" err="1" smtClean="0"/>
+              <a:t>nas</a:t>
+            </a:r>
+            <a:r>
+              <a:rPr lang="en-US" dirty="0" smtClean="0"/>
+              <a:t> Actions que </a:t>
+            </a:r>
+            <a:r>
+              <a:rPr lang="en-US" dirty="0" err="1" smtClean="0"/>
+              <a:t>realizam</a:t>
+            </a:r>
+            <a:r>
+              <a:rPr lang="en-US" dirty="0" smtClean="0"/>
+              <a:t> IO</a:t>
             </a:r>
             <a:endParaRPr lang="en-US" dirty="0"/>
           </a:p>

</xml_diff>